<commit_message>
More deployment-guide edits, incl. updated boilerplate submodule
</commit_message>
<xml_diff>
--- a/docs/images/IMC QS images.pptx
+++ b/docs/images/IMC QS images.pptx
@@ -267,7 +267,7 @@
           <a:p>
             <a:fld id="{9DEB64E9-A623-6D49-92EA-7C36C81F7406}" type="datetimeFigureOut">
               <a:rPr lang="en-US" smtClean="0"/>
-              <a:t>12/28/2020</a:t>
+              <a:t>12/29/2020</a:t>
             </a:fld>
             <a:endParaRPr lang="en-US" dirty="0"/>
           </a:p>
@@ -465,7 +465,7 @@
           <a:p>
             <a:fld id="{9DEB64E9-A623-6D49-92EA-7C36C81F7406}" type="datetimeFigureOut">
               <a:rPr lang="en-US" smtClean="0"/>
-              <a:t>12/28/2020</a:t>
+              <a:t>12/29/2020</a:t>
             </a:fld>
             <a:endParaRPr lang="en-US" dirty="0"/>
           </a:p>
@@ -673,7 +673,7 @@
           <a:p>
             <a:fld id="{9DEB64E9-A623-6D49-92EA-7C36C81F7406}" type="datetimeFigureOut">
               <a:rPr lang="en-US" smtClean="0"/>
-              <a:t>12/28/2020</a:t>
+              <a:t>12/29/2020</a:t>
             </a:fld>
             <a:endParaRPr lang="en-US" dirty="0"/>
           </a:p>
@@ -871,7 +871,7 @@
           <a:p>
             <a:fld id="{9DEB64E9-A623-6D49-92EA-7C36C81F7406}" type="datetimeFigureOut">
               <a:rPr lang="en-US" smtClean="0"/>
-              <a:t>12/28/2020</a:t>
+              <a:t>12/29/2020</a:t>
             </a:fld>
             <a:endParaRPr lang="en-US" dirty="0"/>
           </a:p>
@@ -1146,7 +1146,7 @@
           <a:p>
             <a:fld id="{9DEB64E9-A623-6D49-92EA-7C36C81F7406}" type="datetimeFigureOut">
               <a:rPr lang="en-US" smtClean="0"/>
-              <a:t>12/28/2020</a:t>
+              <a:t>12/29/2020</a:t>
             </a:fld>
             <a:endParaRPr lang="en-US" dirty="0"/>
           </a:p>
@@ -1411,7 +1411,7 @@
           <a:p>
             <a:fld id="{9DEB64E9-A623-6D49-92EA-7C36C81F7406}" type="datetimeFigureOut">
               <a:rPr lang="en-US" smtClean="0"/>
-              <a:t>12/28/2020</a:t>
+              <a:t>12/29/2020</a:t>
             </a:fld>
             <a:endParaRPr lang="en-US" dirty="0"/>
           </a:p>
@@ -1823,7 +1823,7 @@
           <a:p>
             <a:fld id="{9DEB64E9-A623-6D49-92EA-7C36C81F7406}" type="datetimeFigureOut">
               <a:rPr lang="en-US" smtClean="0"/>
-              <a:t>12/28/2020</a:t>
+              <a:t>12/29/2020</a:t>
             </a:fld>
             <a:endParaRPr lang="en-US" dirty="0"/>
           </a:p>
@@ -1964,7 +1964,7 @@
           <a:p>
             <a:fld id="{9DEB64E9-A623-6D49-92EA-7C36C81F7406}" type="datetimeFigureOut">
               <a:rPr lang="en-US" smtClean="0"/>
-              <a:t>12/28/2020</a:t>
+              <a:t>12/29/2020</a:t>
             </a:fld>
             <a:endParaRPr lang="en-US" dirty="0"/>
           </a:p>
@@ -2077,7 +2077,7 @@
           <a:p>
             <a:fld id="{9DEB64E9-A623-6D49-92EA-7C36C81F7406}" type="datetimeFigureOut">
               <a:rPr lang="en-US" smtClean="0"/>
-              <a:t>12/28/2020</a:t>
+              <a:t>12/29/2020</a:t>
             </a:fld>
             <a:endParaRPr lang="en-US" dirty="0"/>
           </a:p>
@@ -2388,7 +2388,7 @@
           <a:p>
             <a:fld id="{9DEB64E9-A623-6D49-92EA-7C36C81F7406}" type="datetimeFigureOut">
               <a:rPr lang="en-US" smtClean="0"/>
-              <a:t>12/28/2020</a:t>
+              <a:t>12/29/2020</a:t>
             </a:fld>
             <a:endParaRPr lang="en-US" dirty="0"/>
           </a:p>
@@ -2676,7 +2676,7 @@
           <a:p>
             <a:fld id="{9DEB64E9-A623-6D49-92EA-7C36C81F7406}" type="datetimeFigureOut">
               <a:rPr lang="en-US" smtClean="0"/>
-              <a:t>12/28/2020</a:t>
+              <a:t>12/29/2020</a:t>
             </a:fld>
             <a:endParaRPr lang="en-US" dirty="0"/>
           </a:p>
@@ -2917,7 +2917,7 @@
           <a:p>
             <a:fld id="{9DEB64E9-A623-6D49-92EA-7C36C81F7406}" type="datetimeFigureOut">
               <a:rPr lang="en-US" smtClean="0"/>
-              <a:t>12/28/2020</a:t>
+              <a:t>12/29/2020</a:t>
             </a:fld>
             <a:endParaRPr lang="en-US" dirty="0"/>
           </a:p>
@@ -3625,8 +3625,8 @@
         </p:nvSpPr>
         <p:spPr>
           <a:xfrm>
-            <a:off x="8019873" y="5155627"/>
-            <a:ext cx="3292363" cy="1019801"/>
+            <a:off x="8019873" y="5002922"/>
+            <a:ext cx="3292363" cy="1341920"/>
           </a:xfrm>
           <a:prstGeom prst="rect">
             <a:avLst/>
@@ -3636,7 +3636,7 @@
           </a:solidFill>
           <a:ln w="12700">
             <a:solidFill>
-              <a:srgbClr val="969696"/>
+              <a:srgbClr val="5A6B86"/>
             </a:solidFill>
             <a:prstDash val="dash"/>
           </a:ln>
@@ -4151,7 +4151,7 @@
           <a:blip r:embed="rId2">
             <a:extLst>
               <a:ext uri="{96DAC541-7B7A-43D3-8B79-37D633B846F1}">
-                <asvg:svgBlip xmlns:asvg="http://schemas.microsoft.com/office/drawing/2016/SVG/main" xmlns="" r:embed="rId15"/>
+                <asvg:svgBlip xmlns="" xmlns:asvg="http://schemas.microsoft.com/office/drawing/2016/SVG/main" r:embed="rId15"/>
               </a:ext>
             </a:extLst>
           </a:blip>
@@ -4321,7 +4321,7 @@
           <a:blip r:embed="rId16">
             <a:extLst>
               <a:ext uri="{96DAC541-7B7A-43D3-8B79-37D633B846F1}">
-                <asvg:svgBlip xmlns:asvg="http://schemas.microsoft.com/office/drawing/2016/SVG/main" xmlns="" r:embed="rId19"/>
+                <asvg:svgBlip xmlns="" xmlns:asvg="http://schemas.microsoft.com/office/drawing/2016/SVG/main" r:embed="rId19"/>
               </a:ext>
             </a:extLst>
           </a:blip>
@@ -4357,7 +4357,7 @@
           <a:blip r:embed="rId20">
             <a:extLst>
               <a:ext uri="{96DAC541-7B7A-43D3-8B79-37D633B846F1}">
-                <asvg:svgBlip xmlns:asvg="http://schemas.microsoft.com/office/drawing/2016/SVG/main" xmlns="" r:embed="rId21"/>
+                <asvg:svgBlip xmlns="" xmlns:asvg="http://schemas.microsoft.com/office/drawing/2016/SVG/main" r:embed="rId21"/>
               </a:ext>
             </a:extLst>
           </a:blip>
@@ -4393,7 +4393,7 @@
           <a:blip r:embed="rId22">
             <a:extLst>
               <a:ext uri="{96DAC541-7B7A-43D3-8B79-37D633B846F1}">
-                <asvg:svgBlip xmlns:asvg="http://schemas.microsoft.com/office/drawing/2016/SVG/main" xmlns="" r:embed="rId23"/>
+                <asvg:svgBlip xmlns="" xmlns:asvg="http://schemas.microsoft.com/office/drawing/2016/SVG/main" r:embed="rId23"/>
               </a:ext>
             </a:extLst>
           </a:blip>
@@ -4563,7 +4563,7 @@
           <a:blip r:embed="rId24">
             <a:extLst>
               <a:ext uri="{96DAC541-7B7A-43D3-8B79-37D633B846F1}">
-                <asvg:svgBlip xmlns:asvg="http://schemas.microsoft.com/office/drawing/2016/SVG/main" xmlns="" r:embed="rId25"/>
+                <asvg:svgBlip xmlns="" xmlns:asvg="http://schemas.microsoft.com/office/drawing/2016/SVG/main" r:embed="rId25"/>
               </a:ext>
             </a:extLst>
           </a:blip>
@@ -4666,7 +4666,7 @@
           <a:blip r:embed="rId24">
             <a:extLst>
               <a:ext uri="{96DAC541-7B7A-43D3-8B79-37D633B846F1}">
-                <asvg:svgBlip xmlns:asvg="http://schemas.microsoft.com/office/drawing/2016/SVG/main" xmlns="" r:embed="rId25"/>
+                <asvg:svgBlip xmlns="" xmlns:asvg="http://schemas.microsoft.com/office/drawing/2016/SVG/main" r:embed="rId25"/>
               </a:ext>
             </a:extLst>
           </a:blip>
@@ -4825,7 +4825,7 @@
           <a:noFill/>
           <a:ln w="12700">
             <a:solidFill>
-              <a:srgbClr val="AAB7B8"/>
+              <a:srgbClr val="5A6B86"/>
             </a:solidFill>
           </a:ln>
         </p:spPr>
@@ -4884,7 +4884,7 @@
           <a:blip r:embed="rId26">
             <a:extLst>
               <a:ext uri="{96DAC541-7B7A-43D3-8B79-37D633B846F1}">
-                <asvg:svgBlip xmlns:asvg="http://schemas.microsoft.com/office/drawing/2016/SVG/main" xmlns="" r:embed="rId28"/>
+                <asvg:svgBlip xmlns="" xmlns:asvg="http://schemas.microsoft.com/office/drawing/2016/SVG/main" r:embed="rId28"/>
               </a:ext>
             </a:extLst>
           </a:blip>
@@ -6190,7 +6190,7 @@
           <a:blip r:embed="rId29">
             <a:extLst>
               <a:ext uri="{96DAC541-7B7A-43D3-8B79-37D633B846F1}">
-                <asvg:svgBlip xmlns:asvg="http://schemas.microsoft.com/office/drawing/2016/SVG/main" xmlns="" r:embed="rId13"/>
+                <asvg:svgBlip xmlns="" xmlns:asvg="http://schemas.microsoft.com/office/drawing/2016/SVG/main" r:embed="rId13"/>
               </a:ext>
             </a:extLst>
           </a:blip>
@@ -6226,7 +6226,7 @@
           <a:blip r:embed="rId30">
             <a:extLst>
               <a:ext uri="{96DAC541-7B7A-43D3-8B79-37D633B846F1}">
-                <asvg:svgBlip xmlns:asvg="http://schemas.microsoft.com/office/drawing/2016/SVG/main" xmlns="" r:embed="rId31"/>
+                <asvg:svgBlip xmlns="" xmlns:asvg="http://schemas.microsoft.com/office/drawing/2016/SVG/main" r:embed="rId31"/>
               </a:ext>
             </a:extLst>
           </a:blip>
@@ -6262,7 +6262,7 @@
           <a:blip r:embed="rId32">
             <a:extLst>
               <a:ext uri="{96DAC541-7B7A-43D3-8B79-37D633B846F1}">
-                <asvg:svgBlip xmlns:asvg="http://schemas.microsoft.com/office/drawing/2016/SVG/main" xmlns="" r:embed="rId9"/>
+                <asvg:svgBlip xmlns="" xmlns:asvg="http://schemas.microsoft.com/office/drawing/2016/SVG/main" r:embed="rId9"/>
               </a:ext>
             </a:extLst>
           </a:blip>
@@ -6298,7 +6298,7 @@
           <a:blip r:embed="rId33">
             <a:extLst>
               <a:ext uri="{96DAC541-7B7A-43D3-8B79-37D633B846F1}">
-                <asvg:svgBlip xmlns:asvg="http://schemas.microsoft.com/office/drawing/2016/SVG/main" xmlns="" r:embed="rId17"/>
+                <asvg:svgBlip xmlns="" xmlns:asvg="http://schemas.microsoft.com/office/drawing/2016/SVG/main" r:embed="rId17"/>
               </a:ext>
             </a:extLst>
           </a:blip>
@@ -6334,7 +6334,7 @@
           <a:blip r:embed="rId34">
             <a:extLst>
               <a:ext uri="{96DAC541-7B7A-43D3-8B79-37D633B846F1}">
-                <asvg:svgBlip xmlns:asvg="http://schemas.microsoft.com/office/drawing/2016/SVG/main" xmlns="" r:embed="rId35"/>
+                <asvg:svgBlip xmlns="" xmlns:asvg="http://schemas.microsoft.com/office/drawing/2016/SVG/main" r:embed="rId35"/>
               </a:ext>
             </a:extLst>
           </a:blip>
@@ -6370,7 +6370,7 @@
           <a:blip r:embed="rId36">
             <a:extLst>
               <a:ext uri="{96DAC541-7B7A-43D3-8B79-37D633B846F1}">
-                <asvg:svgBlip xmlns:asvg="http://schemas.microsoft.com/office/drawing/2016/SVG/main" xmlns="" r:embed="rId37"/>
+                <asvg:svgBlip xmlns="" xmlns:asvg="http://schemas.microsoft.com/office/drawing/2016/SVG/main" r:embed="rId37"/>
               </a:ext>
             </a:extLst>
           </a:blip>
@@ -6411,7 +6411,7 @@
           <a:noFill/>
           <a:ln w="12700">
             <a:solidFill>
-              <a:srgbClr val="969696"/>
+              <a:srgbClr val="5A6B86"/>
             </a:solidFill>
             <a:prstDash val="dash"/>
           </a:ln>
@@ -6462,7 +6462,7 @@
         <p:spPr>
           <a:xfrm>
             <a:off x="3484625" y="3084616"/>
-            <a:ext cx="1956433" cy="461665"/>
+            <a:ext cx="1956433" cy="430887"/>
           </a:xfrm>
           <a:prstGeom prst="rect">
             <a:avLst/>
@@ -6477,76 +6477,69 @@
           <a:p>
             <a:pPr algn="ctr"/>
             <a:r>
-              <a:rPr lang="en-US" sz="1200" dirty="0">
+              <a:rPr lang="en-US" sz="1100" dirty="0">
                 <a:solidFill>
-                  <a:srgbClr val="969696"/>
+                  <a:srgbClr val="5A6B86"/>
                 </a:solidFill>
                 <a:latin typeface="Arial" panose="020B0604020202020204" pitchFamily="34" charset="0"/>
-                <a:ea typeface="Amazon Ember" panose="020B0603020204020204" pitchFamily="34" charset="0"/>
                 <a:cs typeface="Arial" panose="020B0604020202020204" pitchFamily="34" charset="0"/>
               </a:rPr>
               <a:t>Custom Lambda </a:t>
             </a:r>
             <a:r>
-              <a:rPr lang="en-US" sz="1200" dirty="0" smtClean="0">
+              <a:rPr lang="en-US" sz="1100" dirty="0">
                 <a:solidFill>
-                  <a:srgbClr val="969696"/>
+                  <a:srgbClr val="5A6B86"/>
                 </a:solidFill>
                 <a:latin typeface="Arial" panose="020B0604020202020204" pitchFamily="34" charset="0"/>
-                <a:ea typeface="Amazon Ember" panose="020B0603020204020204" pitchFamily="34" charset="0"/>
                 <a:cs typeface="Arial" panose="020B0604020202020204" pitchFamily="34" charset="0"/>
               </a:rPr>
               <a:t>functions </a:t>
             </a:r>
             <a:r>
-              <a:rPr lang="en-US" sz="1200" dirty="0">
+              <a:rPr lang="en-US" sz="1100" dirty="0">
                 <a:solidFill>
-                  <a:srgbClr val="969696"/>
+                  <a:srgbClr val="5A6B86"/>
                 </a:solidFill>
                 <a:latin typeface="Arial" panose="020B0604020202020204" pitchFamily="34" charset="0"/>
-                <a:ea typeface="Amazon Ember" panose="020B0603020204020204" pitchFamily="34" charset="0"/>
                 <a:cs typeface="Arial" panose="020B0604020202020204" pitchFamily="34" charset="0"/>
               </a:rPr>
               <a:t/>
             </a:r>
             <a:br>
-              <a:rPr lang="en-US" sz="1200" dirty="0">
+              <a:rPr lang="en-US" sz="1100" dirty="0">
                 <a:solidFill>
-                  <a:srgbClr val="969696"/>
+                  <a:srgbClr val="5A6B86"/>
                 </a:solidFill>
                 <a:latin typeface="Arial" panose="020B0604020202020204" pitchFamily="34" charset="0"/>
-                <a:ea typeface="Amazon Ember" panose="020B0603020204020204" pitchFamily="34" charset="0"/>
                 <a:cs typeface="Arial" panose="020B0604020202020204" pitchFamily="34" charset="0"/>
               </a:rPr>
             </a:br>
             <a:r>
               <a:rPr lang="en-US" sz="1100" dirty="0">
                 <a:solidFill>
-                  <a:srgbClr val="969696"/>
+                  <a:srgbClr val="5A6B86"/>
                 </a:solidFill>
                 <a:latin typeface="Arial" panose="020B0604020202020204" pitchFamily="34" charset="0"/>
-                <a:ea typeface="Amazon Ember" panose="020B0603020204020204" pitchFamily="34" charset="0"/>
                 <a:cs typeface="Arial" panose="020B0604020202020204" pitchFamily="34" charset="0"/>
               </a:rPr>
               <a:t>(ML inference, ETL, etc</a:t>
             </a:r>
             <a:r>
-              <a:rPr lang="en-US" sz="1100" dirty="0" smtClean="0">
+              <a:rPr lang="en-US" sz="1100" dirty="0">
                 <a:solidFill>
-                  <a:srgbClr val="969696"/>
+                  <a:srgbClr val="5A6B86"/>
                 </a:solidFill>
                 <a:latin typeface="Arial" panose="020B0604020202020204" pitchFamily="34" charset="0"/>
-                <a:ea typeface="Amazon Ember" panose="020B0603020204020204" pitchFamily="34" charset="0"/>
                 <a:cs typeface="Arial" panose="020B0604020202020204" pitchFamily="34" charset="0"/>
               </a:rPr>
               <a:t>.)</a:t>
             </a:r>
             <a:endParaRPr lang="en-US" sz="1100" dirty="0">
               <a:solidFill>
-                <a:srgbClr val="969696"/>
+                <a:srgbClr val="5A6B86"/>
               </a:solidFill>
               <a:latin typeface="Arial" panose="020B0604020202020204" pitchFamily="34" charset="0"/>
-              <a:ea typeface="Amazon Ember" panose="020B0603020204020204" pitchFamily="34" charset="0"/>
               <a:cs typeface="Arial" panose="020B0604020202020204" pitchFamily="34" charset="0"/>
             </a:endParaRPr>
           </a:p>
@@ -6566,7 +6559,7 @@
         </p:nvSpPr>
         <p:spPr>
           <a:xfrm>
-            <a:off x="8098890" y="5486838"/>
+            <a:off x="8098890" y="5556579"/>
             <a:ext cx="1731340" cy="587805"/>
           </a:xfrm>
           <a:prstGeom prst="rect">
@@ -6657,7 +6650,7 @@
         </p:nvSpPr>
         <p:spPr>
           <a:xfrm>
-            <a:off x="9965937" y="5486839"/>
+            <a:off x="9965937" y="5556580"/>
             <a:ext cx="763796" cy="587804"/>
           </a:xfrm>
           <a:prstGeom prst="rect">
@@ -6721,7 +6714,7 @@
         </p:nvCxnSpPr>
         <p:spPr>
           <a:xfrm flipH="1">
-            <a:off x="9830230" y="5780741"/>
+            <a:off x="9830230" y="5850482"/>
             <a:ext cx="143328" cy="0"/>
           </a:xfrm>
           <a:prstGeom prst="straightConnector1">
@@ -6770,7 +6763,7 @@
           <a:blip r:embed="rId32">
             <a:extLst>
               <a:ext uri="{96DAC541-7B7A-43D3-8B79-37D633B846F1}">
-                <asvg:svgBlip xmlns:asvg="http://schemas.microsoft.com/office/drawing/2016/SVG/main" xmlns="" r:embed="rId9"/>
+                <asvg:svgBlip xmlns="" xmlns:asvg="http://schemas.microsoft.com/office/drawing/2016/SVG/main" r:embed="rId9"/>
               </a:ext>
             </a:extLst>
           </a:blip>
@@ -6780,7 +6773,7 @@
         </p:blipFill>
         <p:spPr>
           <a:xfrm>
-            <a:off x="10813589" y="5223977"/>
+            <a:off x="10813589" y="5056287"/>
             <a:ext cx="432000" cy="432000"/>
           </a:xfrm>
           <a:prstGeom prst="rect">
@@ -6806,7 +6799,7 @@
           <a:blip r:embed="rId38">
             <a:extLst>
               <a:ext uri="{96DAC541-7B7A-43D3-8B79-37D633B846F1}">
-                <asvg:svgBlip xmlns:asvg="http://schemas.microsoft.com/office/drawing/2016/SVG/main" xmlns="" r:embed="rId11"/>
+                <asvg:svgBlip xmlns="" xmlns:asvg="http://schemas.microsoft.com/office/drawing/2016/SVG/main" r:embed="rId11"/>
               </a:ext>
             </a:extLst>
           </a:blip>
@@ -6816,7 +6809,7 @@
         </p:blipFill>
         <p:spPr>
           <a:xfrm>
-            <a:off x="10813589" y="5690785"/>
+            <a:off x="10813589" y="5721781"/>
             <a:ext cx="429744" cy="429744"/>
           </a:xfrm>
           <a:prstGeom prst="rect">
@@ -6838,8 +6831,8 @@
         </p:nvSpPr>
         <p:spPr>
           <a:xfrm>
-            <a:off x="8615578" y="6149427"/>
-            <a:ext cx="2119226" cy="461665"/>
+            <a:off x="10809623" y="5462677"/>
+            <a:ext cx="430210" cy="261610"/>
           </a:xfrm>
           <a:prstGeom prst="rect">
             <a:avLst/>
@@ -6861,39 +6854,12 @@
               <a:defRPr/>
             </a:pPr>
             <a:r>
-              <a:rPr lang="en-US" sz="1200" dirty="0" smtClean="0">
-                <a:latin typeface="Arial" panose="020B0604020202020204" pitchFamily="34" charset="0"/>
-                <a:ea typeface="Amazon Ember" panose="020B0603020204020204" pitchFamily="34" charset="0"/>
-                <a:cs typeface="Arial" panose="020B0604020202020204" pitchFamily="34" charset="0"/>
-              </a:rPr>
-              <a:t>S3 </a:t>
-            </a:r>
-            <a:r>
-              <a:rPr lang="en-US" sz="1200" dirty="0">
-                <a:latin typeface="Arial" panose="020B0604020202020204" pitchFamily="34" charset="0"/>
-                <a:ea typeface="Amazon Ember" panose="020B0603020204020204" pitchFamily="34" charset="0"/>
-                <a:cs typeface="Arial" panose="020B0604020202020204" pitchFamily="34" charset="0"/>
-              </a:rPr>
-              <a:t>+ Lambda</a:t>
-            </a:r>
-          </a:p>
-          <a:p>
-            <a:pPr algn="ctr" defTabSz="1096933" fontAlgn="base">
-              <a:spcBef>
-                <a:spcPct val="0"/>
-              </a:spcBef>
-              <a:spcAft>
-                <a:spcPct val="0"/>
-              </a:spcAft>
-              <a:defRPr/>
-            </a:pPr>
-            <a:r>
               <a:rPr lang="en-US" sz="1100" dirty="0" smtClean="0">
                 <a:latin typeface="Arial" panose="020B0604020202020204" pitchFamily="34" charset="0"/>
                 <a:ea typeface="Amazon Ember" panose="020B0603020204020204" pitchFamily="34" charset="0"/>
                 <a:cs typeface="Arial" panose="020B0604020202020204" pitchFamily="34" charset="0"/>
               </a:rPr>
-              <a:t>(asset hierarchy modeling)</a:t>
+              <a:t>S3</a:t>
             </a:r>
             <a:endParaRPr lang="en-US" sz="1100" dirty="0">
               <a:latin typeface="Arial" panose="020B0604020202020204" pitchFamily="34" charset="0"/>
@@ -6911,8 +6877,8 @@
         </p:nvSpPr>
         <p:spPr>
           <a:xfrm>
-            <a:off x="8674945" y="5176904"/>
-            <a:ext cx="1956433" cy="276999"/>
+            <a:off x="8564429" y="5020529"/>
+            <a:ext cx="2166694" cy="430887"/>
           </a:xfrm>
           <a:prstGeom prst="rect">
             <a:avLst/>
@@ -6927,24 +6893,64 @@
           <a:p>
             <a:pPr algn="ctr"/>
             <a:r>
-              <a:rPr lang="en-US" sz="1200" dirty="0" smtClean="0">
+              <a:rPr lang="en-US" sz="1100" dirty="0" smtClean="0">
                 <a:solidFill>
-                  <a:srgbClr val="969696"/>
+                  <a:srgbClr val="5A6B86"/>
                 </a:solidFill>
                 <a:latin typeface="Arial" panose="020B0604020202020204" pitchFamily="34" charset="0"/>
-                <a:ea typeface="Amazon Ember" panose="020B0603020204020204" pitchFamily="34" charset="0"/>
                 <a:cs typeface="Arial" panose="020B0604020202020204" pitchFamily="34" charset="0"/>
               </a:rPr>
-              <a:t>Asset Model Converter</a:t>
-            </a:r>
-            <a:endParaRPr lang="en-US" sz="1200" dirty="0">
-              <a:solidFill>
-                <a:srgbClr val="969696"/>
-              </a:solidFill>
-              <a:latin typeface="Arial" panose="020B0604020202020204" pitchFamily="34" charset="0"/>
-              <a:ea typeface="Amazon Ember" panose="020B0603020204020204" pitchFamily="34" charset="0"/>
-              <a:cs typeface="Arial" panose="020B0604020202020204" pitchFamily="34" charset="0"/>
-            </a:endParaRPr>
+              <a:t>Asset </a:t>
+            </a:r>
+            <a:r>
+              <a:rPr lang="en-US" sz="1100" dirty="0">
+                <a:solidFill>
+                  <a:srgbClr val="5A6B86"/>
+                </a:solidFill>
+                <a:latin typeface="Arial" panose="020B0604020202020204" pitchFamily="34" charset="0"/>
+                <a:cs typeface="Arial" panose="020B0604020202020204" pitchFamily="34" charset="0"/>
+              </a:rPr>
+              <a:t>Model Converter</a:t>
+            </a:r>
+            <a:br>
+              <a:rPr lang="en-US" sz="1100" dirty="0">
+                <a:solidFill>
+                  <a:srgbClr val="5A6B86"/>
+                </a:solidFill>
+                <a:latin typeface="Arial" panose="020B0604020202020204" pitchFamily="34" charset="0"/>
+                <a:cs typeface="Arial" panose="020B0604020202020204" pitchFamily="34" charset="0"/>
+              </a:rPr>
+            </a:br>
+            <a:r>
+              <a:rPr lang="en-US" sz="1100" dirty="0">
+                <a:solidFill>
+                  <a:srgbClr val="5A6B86"/>
+                </a:solidFill>
+                <a:latin typeface="Arial" panose="020B0604020202020204" pitchFamily="34" charset="0"/>
+                <a:cs typeface="Arial" panose="020B0604020202020204" pitchFamily="34" charset="0"/>
+              </a:rPr>
+              <a:t>(</a:t>
+            </a:r>
+            <a:r>
+              <a:rPr lang="en-US" sz="1100" dirty="0" smtClean="0">
+                <a:solidFill>
+                  <a:srgbClr val="5A6B86"/>
+                </a:solidFill>
+                <a:latin typeface="Arial" panose="020B0604020202020204" pitchFamily="34" charset="0"/>
+                <a:cs typeface="Arial" panose="020B0604020202020204" pitchFamily="34" charset="0"/>
+              </a:rPr>
+              <a:t>asset-hierarchy </a:t>
+            </a:r>
+            <a:r>
+              <a:rPr lang="en-US" sz="1100" dirty="0">
+                <a:solidFill>
+                  <a:srgbClr val="5A6B86"/>
+                </a:solidFill>
+                <a:latin typeface="Arial" panose="020B0604020202020204" pitchFamily="34" charset="0"/>
+                <a:cs typeface="Arial" panose="020B0604020202020204" pitchFamily="34" charset="0"/>
+              </a:rPr>
+              <a:t>modeling)</a:t>
+            </a:r>
           </a:p>
         </p:txBody>
       </p:sp>
@@ -7517,6 +7523,58 @@
               </a:rPr>
               <a:t>or</a:t>
             </a:r>
+          </a:p>
+        </p:txBody>
+      </p:sp>
+      <p:sp>
+        <p:nvSpPr>
+          <p:cNvPr id="90" name="Rectangle 89">
+            <a:extLst>
+              <a:ext uri="{FF2B5EF4-FFF2-40B4-BE49-F238E27FC236}">
+                <a16:creationId xmlns:a16="http://schemas.microsoft.com/office/drawing/2014/main" id="{8B4912DE-30E4-9342-BCA3-E457ED3BE1FB}"/>
+              </a:ext>
+            </a:extLst>
+          </p:cNvPr>
+          <p:cNvSpPr/>
+          <p:nvPr/>
+        </p:nvSpPr>
+        <p:spPr>
+          <a:xfrm>
+            <a:off x="10674371" y="6109856"/>
+            <a:ext cx="700714" cy="261610"/>
+          </a:xfrm>
+          <a:prstGeom prst="rect">
+            <a:avLst/>
+          </a:prstGeom>
+        </p:spPr>
+        <p:txBody>
+          <a:bodyPr wrap="square">
+            <a:spAutoFit/>
+          </a:bodyPr>
+          <a:lstStyle/>
+          <a:p>
+            <a:pPr algn="ctr" defTabSz="1096933" fontAlgn="base">
+              <a:spcBef>
+                <a:spcPct val="0"/>
+              </a:spcBef>
+              <a:spcAft>
+                <a:spcPct val="0"/>
+              </a:spcAft>
+              <a:defRPr/>
+            </a:pPr>
+            <a:r>
+              <a:rPr lang="en-US" sz="1100" dirty="0" smtClean="0">
+                <a:latin typeface="Arial" panose="020B0604020202020204" pitchFamily="34" charset="0"/>
+                <a:ea typeface="Amazon Ember" panose="020B0603020204020204" pitchFamily="34" charset="0"/>
+                <a:cs typeface="Arial" panose="020B0604020202020204" pitchFamily="34" charset="0"/>
+              </a:rPr>
+              <a:t>Lambda</a:t>
+            </a:r>
+            <a:endParaRPr lang="en-US" sz="1100" dirty="0">
+              <a:latin typeface="Arial" panose="020B0604020202020204" pitchFamily="34" charset="0"/>
+              <a:ea typeface="Amazon Ember" panose="020B0603020204020204" pitchFamily="34" charset="0"/>
+              <a:cs typeface="Arial" panose="020B0604020202020204" pitchFamily="34" charset="0"/>
+            </a:endParaRPr>
           </a:p>
         </p:txBody>
       </p:sp>
@@ -7836,121 +7894,6 @@
                 <a:schemeClr val="tx1"/>
               </a:solidFill>
               <a:latin typeface="Arial" panose="020B0604020202020204" pitchFamily="34" charset="0"/>
-              <a:cs typeface="Arial" panose="020B0604020202020204" pitchFamily="34" charset="0"/>
-            </a:endParaRPr>
-          </a:p>
-        </p:txBody>
-      </p:sp>
-      <p:cxnSp>
-        <p:nvCxnSpPr>
-          <p:cNvPr id="184" name="Straight Arrow Connector 183">
-            <a:extLst>
-              <a:ext uri="{FF2B5EF4-FFF2-40B4-BE49-F238E27FC236}">
-                <a16:creationId xmlns:a16="http://schemas.microsoft.com/office/drawing/2014/main" id="{0A59238E-FEEB-C84D-82B4-5FAFE96CFDD5}"/>
-              </a:ext>
-            </a:extLst>
-          </p:cNvPr>
-          <p:cNvCxnSpPr>
-            <a:cxnSpLocks/>
-          </p:cNvCxnSpPr>
-          <p:nvPr/>
-        </p:nvCxnSpPr>
-        <p:spPr>
-          <a:xfrm>
-            <a:off x="8077446" y="5428517"/>
-            <a:ext cx="568557" cy="3325"/>
-          </a:xfrm>
-          <a:prstGeom prst="straightConnector1">
-            <a:avLst/>
-          </a:prstGeom>
-          <a:ln w="12700">
-            <a:solidFill>
-              <a:schemeClr val="bg1">
-                <a:lumMod val="25000"/>
-              </a:schemeClr>
-            </a:solidFill>
-            <a:prstDash val="sysDot"/>
-            <a:headEnd type="arrow" w="med" len="sm"/>
-            <a:tailEnd type="none" w="med" len="sm"/>
-          </a:ln>
-        </p:spPr>
-        <p:style>
-          <a:lnRef idx="1">
-            <a:schemeClr val="accent1"/>
-          </a:lnRef>
-          <a:fillRef idx="0">
-            <a:schemeClr val="accent1"/>
-          </a:fillRef>
-          <a:effectRef idx="0">
-            <a:schemeClr val="accent1"/>
-          </a:effectRef>
-          <a:fontRef idx="minor">
-            <a:schemeClr val="tx1"/>
-          </a:fontRef>
-        </p:style>
-      </p:cxnSp>
-      <p:sp>
-        <p:nvSpPr>
-          <p:cNvPr id="193" name="Rectangle 192">
-            <a:extLst>
-              <a:ext uri="{FF2B5EF4-FFF2-40B4-BE49-F238E27FC236}">
-                <a16:creationId xmlns:a16="http://schemas.microsoft.com/office/drawing/2014/main" id="{6C885C74-9C58-7A41-A997-93D658A1C9A3}"/>
-              </a:ext>
-            </a:extLst>
-          </p:cNvPr>
-          <p:cNvSpPr/>
-          <p:nvPr/>
-        </p:nvSpPr>
-        <p:spPr>
-          <a:xfrm>
-            <a:off x="8635999" y="4827967"/>
-            <a:ext cx="3302001" cy="1019801"/>
-          </a:xfrm>
-          <a:prstGeom prst="rect">
-            <a:avLst/>
-          </a:prstGeom>
-          <a:solidFill>
-            <a:schemeClr val="bg1"/>
-          </a:solidFill>
-          <a:ln w="12700">
-            <a:solidFill>
-              <a:srgbClr val="969696"/>
-            </a:solidFill>
-            <a:prstDash val="dash"/>
-          </a:ln>
-        </p:spPr>
-        <p:style>
-          <a:lnRef idx="2">
-            <a:schemeClr val="accent1">
-              <a:shade val="50000"/>
-            </a:schemeClr>
-          </a:lnRef>
-          <a:fillRef idx="1">
-            <a:schemeClr val="accent1"/>
-          </a:fillRef>
-          <a:effectRef idx="0">
-            <a:schemeClr val="accent1"/>
-          </a:effectRef>
-          <a:fontRef idx="minor">
-            <a:schemeClr val="lt1"/>
-          </a:fontRef>
-        </p:style>
-        <p:txBody>
-          <a:bodyPr rot="0" spcFirstLastPara="0" vertOverflow="overflow" horzOverflow="overflow" vert="horz" wrap="square" lIns="146304" tIns="146304" rIns="146304" bIns="73152" numCol="1" spcCol="0" rtlCol="0" fromWordArt="0" anchor="t" anchorCtr="0" forceAA="0" compatLnSpc="1">
-            <a:prstTxWarp prst="textNoShape">
-              <a:avLst/>
-            </a:prstTxWarp>
-            <a:noAutofit/>
-          </a:bodyPr>
-          <a:lstStyle/>
-          <a:p>
-            <a:pPr algn="ctr"/>
-            <a:endParaRPr lang="en-US" sz="1200" dirty="0">
-              <a:solidFill>
-                <a:schemeClr val="tx1"/>
-              </a:solidFill>
-              <a:latin typeface="Arial" panose="020B0604020202020204" pitchFamily="34" charset="0"/>
-              <a:ea typeface="Amazon Ember" panose="020B0603020204020204" pitchFamily="34" charset="0"/>
               <a:cs typeface="Arial" panose="020B0604020202020204" pitchFamily="34" charset="0"/>
             </a:endParaRPr>
           </a:p>
@@ -9628,7 +9571,7 @@
           <a:noFill/>
           <a:ln w="12700">
             <a:solidFill>
-              <a:srgbClr val="AAB7B8"/>
+              <a:srgbClr val="5A6B86"/>
             </a:solidFill>
           </a:ln>
         </p:spPr>
@@ -9721,14 +9664,6 @@
               </a:rPr>
               <a:t>Greengrass core </a:t>
             </a:r>
-            <a:r>
-              <a:rPr lang="en-US" sz="1200" dirty="0" smtClean="0">
-                <a:latin typeface="Arial" panose="020B0604020202020204" pitchFamily="34" charset="0"/>
-                <a:ea typeface="Amazon Ember" panose="020B0603020204020204" pitchFamily="34" charset="0"/>
-                <a:cs typeface="Arial" panose="020B0604020202020204" pitchFamily="34" charset="0"/>
-              </a:rPr>
-              <a:t/>
-            </a:r>
             <a:br>
               <a:rPr lang="en-US" sz="1200" dirty="0" smtClean="0">
                 <a:latin typeface="Arial" panose="020B0604020202020204" pitchFamily="34" charset="0"/>
@@ -10070,7 +10005,7 @@
           <a:noFill/>
           <a:ln w="12700">
             <a:solidFill>
-              <a:srgbClr val="969696"/>
+              <a:srgbClr val="5A6B86"/>
             </a:solidFill>
             <a:prstDash val="dash"/>
           </a:ln>
@@ -11726,177 +11661,26 @@
           </a:fontRef>
         </p:style>
       </p:cxnSp>
-      <p:sp>
-        <p:nvSpPr>
-          <p:cNvPr id="181" name="Rectangle 180">
-            <a:extLst>
-              <a:ext uri="{FF2B5EF4-FFF2-40B4-BE49-F238E27FC236}">
-                <a16:creationId xmlns:a16="http://schemas.microsoft.com/office/drawing/2014/main" id="{547AD1BB-2848-A343-81F7-C0220B4EC2BA}"/>
-              </a:ext>
-            </a:extLst>
-          </p:cNvPr>
-          <p:cNvSpPr/>
-          <p:nvPr/>
-        </p:nvSpPr>
-        <p:spPr>
-          <a:xfrm>
-            <a:off x="8714416" y="5159178"/>
-            <a:ext cx="1731340" cy="587805"/>
-          </a:xfrm>
-          <a:prstGeom prst="rect">
-            <a:avLst/>
-          </a:prstGeom>
-          <a:noFill/>
-          <a:ln>
-            <a:solidFill>
-              <a:srgbClr val="404040"/>
-            </a:solidFill>
-          </a:ln>
-          <a:effectLst/>
-        </p:spPr>
-        <p:style>
-          <a:lnRef idx="1">
-            <a:schemeClr val="accent1"/>
-          </a:lnRef>
-          <a:fillRef idx="3">
-            <a:schemeClr val="accent1"/>
-          </a:fillRef>
-          <a:effectRef idx="2">
-            <a:schemeClr val="accent1"/>
-          </a:effectRef>
-          <a:fontRef idx="minor">
-            <a:schemeClr val="lt1"/>
-          </a:fontRef>
-        </p:style>
-        <p:txBody>
-          <a:bodyPr rtlCol="0" anchor="t"/>
-          <a:lstStyle/>
-          <a:p>
-            <a:pPr algn="ctr"/>
-            <a:r>
-              <a:rPr lang="en-US" sz="1100" dirty="0" smtClean="0">
-                <a:solidFill>
-                  <a:schemeClr val="tx1"/>
-                </a:solidFill>
-                <a:latin typeface="Arial" panose="020B0604020202020204" pitchFamily="34" charset="0"/>
-                <a:ea typeface="Amazon Ember" panose="020B0603020204020204" pitchFamily="34" charset="0"/>
-                <a:cs typeface="Arial" panose="020B0604020202020204" pitchFamily="34" charset="0"/>
-              </a:rPr>
-              <a:t>Edge application (Ignition, KEPServerEX) </a:t>
-            </a:r>
-            <a:r>
-              <a:rPr lang="en-US" sz="1100" dirty="0">
-                <a:solidFill>
-                  <a:schemeClr val="tx1"/>
-                </a:solidFill>
-                <a:latin typeface="Arial" panose="020B0604020202020204" pitchFamily="34" charset="0"/>
-                <a:ea typeface="Amazon Ember" panose="020B0603020204020204" pitchFamily="34" charset="0"/>
-                <a:cs typeface="Arial" panose="020B0604020202020204" pitchFamily="34" charset="0"/>
-              </a:rPr>
-              <a:t>tag hierar</a:t>
-            </a:r>
-            <a:r>
-              <a:rPr lang="en-US" sz="1100" dirty="0" smtClean="0">
-                <a:solidFill>
-                  <a:schemeClr val="tx1"/>
-                </a:solidFill>
-                <a:latin typeface="Arial" panose="020B0604020202020204" pitchFamily="34" charset="0"/>
-                <a:ea typeface="Amazon Ember" panose="020B0603020204020204" pitchFamily="34" charset="0"/>
-                <a:cs typeface="Arial" panose="020B0604020202020204" pitchFamily="34" charset="0"/>
-              </a:rPr>
-              <a:t>chy</a:t>
-            </a:r>
-            <a:endParaRPr lang="en-US" sz="1100" dirty="0">
-              <a:solidFill>
-                <a:schemeClr val="tx1"/>
-              </a:solidFill>
-              <a:latin typeface="Arial" panose="020B0604020202020204" pitchFamily="34" charset="0"/>
-              <a:ea typeface="Amazon Ember" panose="020B0603020204020204" pitchFamily="34" charset="0"/>
-              <a:cs typeface="Arial" panose="020B0604020202020204" pitchFamily="34" charset="0"/>
-            </a:endParaRPr>
-          </a:p>
-        </p:txBody>
-      </p:sp>
-      <p:sp>
-        <p:nvSpPr>
-          <p:cNvPr id="182" name="Rectangle 181">
-            <a:extLst>
-              <a:ext uri="{FF2B5EF4-FFF2-40B4-BE49-F238E27FC236}">
-                <a16:creationId xmlns:a16="http://schemas.microsoft.com/office/drawing/2014/main" id="{A2476832-C43B-D041-92DB-71A2FF779890}"/>
-              </a:ext>
-            </a:extLst>
-          </p:cNvPr>
-          <p:cNvSpPr/>
-          <p:nvPr/>
-        </p:nvSpPr>
-        <p:spPr>
-          <a:xfrm>
-            <a:off x="10581463" y="5159179"/>
-            <a:ext cx="763796" cy="587804"/>
-          </a:xfrm>
-          <a:prstGeom prst="rect">
-            <a:avLst/>
-          </a:prstGeom>
-          <a:noFill/>
-          <a:ln>
-            <a:solidFill>
-              <a:schemeClr val="tx1"/>
-            </a:solidFill>
-          </a:ln>
-          <a:effectLst/>
-        </p:spPr>
-        <p:style>
-          <a:lnRef idx="1">
-            <a:schemeClr val="accent1"/>
-          </a:lnRef>
-          <a:fillRef idx="3">
-            <a:schemeClr val="accent1"/>
-          </a:fillRef>
-          <a:effectRef idx="2">
-            <a:schemeClr val="accent1"/>
-          </a:effectRef>
-          <a:fontRef idx="minor">
-            <a:schemeClr val="lt1"/>
-          </a:fontRef>
-        </p:style>
-        <p:txBody>
-          <a:bodyPr rtlCol="0" anchor="t"/>
-          <a:lstStyle/>
-          <a:p>
-            <a:pPr algn="ctr"/>
-            <a:r>
-              <a:rPr lang="en-US" sz="1100" dirty="0">
-                <a:solidFill>
-                  <a:schemeClr val="tx1"/>
-                </a:solidFill>
-                <a:latin typeface="Arial" panose="020B0604020202020204" pitchFamily="34" charset="0"/>
-                <a:ea typeface="Amazon Ember" panose="020B0603020204020204" pitchFamily="34" charset="0"/>
-                <a:cs typeface="Arial" panose="020B0604020202020204" pitchFamily="34" charset="0"/>
-              </a:rPr>
-              <a:t>SiteWise asset hierarchy</a:t>
-            </a:r>
-          </a:p>
-        </p:txBody>
-      </p:sp>
       <p:cxnSp>
         <p:nvCxnSpPr>
-          <p:cNvPr id="183" name="Straight Arrow Connector 182">
-            <a:extLst>
-              <a:ext uri="{FF2B5EF4-FFF2-40B4-BE49-F238E27FC236}">
-                <a16:creationId xmlns:a16="http://schemas.microsoft.com/office/drawing/2014/main" id="{0FFCEBE0-98EB-EF40-AEFF-0819513AEDAD}"/>
+          <p:cNvPr id="189" name="Straight Arrow Connector 188">
+            <a:extLst>
+              <a:ext uri="{FF2B5EF4-FFF2-40B4-BE49-F238E27FC236}">
+                <a16:creationId xmlns:a16="http://schemas.microsoft.com/office/drawing/2014/main" id="{BBF7CC61-94A3-BA44-ABF1-030302B2BC29}"/>
               </a:ext>
             </a:extLst>
           </p:cNvPr>
           <p:cNvCxnSpPr>
             <a:cxnSpLocks/>
-            <a:endCxn id="181" idx="3"/>
+            <a:stCxn id="138" idx="3"/>
+            <a:endCxn id="203" idx="1"/>
           </p:cNvCxnSpPr>
           <p:nvPr/>
         </p:nvCxnSpPr>
         <p:spPr>
-          <a:xfrm flipH="1">
-            <a:off x="10445756" y="5453081"/>
-            <a:ext cx="143328" cy="0"/>
+          <a:xfrm flipV="1">
+            <a:off x="6061996" y="2649328"/>
+            <a:ext cx="2496400" cy="15725"/>
           </a:xfrm>
           <a:prstGeom prst="straightConnector1">
             <a:avLst/>
@@ -11926,127 +11710,6 @@
           </a:fontRef>
         </p:style>
       </p:cxnSp>
-      <p:pic>
-        <p:nvPicPr>
-          <p:cNvPr id="185" name="Graphic 184">
-            <a:extLst>
-              <a:ext uri="{FF2B5EF4-FFF2-40B4-BE49-F238E27FC236}">
-                <a16:creationId xmlns:a16="http://schemas.microsoft.com/office/drawing/2014/main" id="{537287BB-EA8A-5D48-A976-5EA0D36D7D7F}"/>
-              </a:ext>
-            </a:extLst>
-          </p:cNvPr>
-          <p:cNvPicPr>
-            <a:picLocks noChangeAspect="1"/>
-          </p:cNvPicPr>
-          <p:nvPr/>
-        </p:nvPicPr>
-        <p:blipFill>
-          <a:blip r:embed="rId3">
-            <a:extLst>
-              <a:ext uri="{96DAC541-7B7A-43D3-8B79-37D633B846F1}">
-                <asvg:svgBlip xmlns:asvg="http://schemas.microsoft.com/office/drawing/2016/SVG/main" xmlns="" r:embed="rId9"/>
-              </a:ext>
-            </a:extLst>
-          </a:blip>
-          <a:stretch>
-            <a:fillRect/>
-          </a:stretch>
-        </p:blipFill>
-        <p:spPr>
-          <a:xfrm>
-            <a:off x="11429115" y="4896317"/>
-            <a:ext cx="432000" cy="432000"/>
-          </a:xfrm>
-          <a:prstGeom prst="rect">
-            <a:avLst/>
-          </a:prstGeom>
-        </p:spPr>
-      </p:pic>
-      <p:pic>
-        <p:nvPicPr>
-          <p:cNvPr id="186" name="Graphic 185">
-            <a:extLst>
-              <a:ext uri="{FF2B5EF4-FFF2-40B4-BE49-F238E27FC236}">
-                <a16:creationId xmlns:a16="http://schemas.microsoft.com/office/drawing/2014/main" id="{D897B21E-6937-904D-9DAB-2E95DBBC75FF}"/>
-              </a:ext>
-            </a:extLst>
-          </p:cNvPr>
-          <p:cNvPicPr>
-            <a:picLocks noChangeAspect="1"/>
-          </p:cNvPicPr>
-          <p:nvPr/>
-        </p:nvPicPr>
-        <p:blipFill>
-          <a:blip r:embed="rId10">
-            <a:extLst>
-              <a:ext uri="{96DAC541-7B7A-43D3-8B79-37D633B846F1}">
-                <asvg:svgBlip xmlns:asvg="http://schemas.microsoft.com/office/drawing/2016/SVG/main" xmlns="" r:embed="rId11"/>
-              </a:ext>
-            </a:extLst>
-          </a:blip>
-          <a:stretch>
-            <a:fillRect/>
-          </a:stretch>
-        </p:blipFill>
-        <p:spPr>
-          <a:xfrm>
-            <a:off x="11429115" y="5363125"/>
-            <a:ext cx="429744" cy="429744"/>
-          </a:xfrm>
-          <a:prstGeom prst="rect">
-            <a:avLst/>
-          </a:prstGeom>
-        </p:spPr>
-      </p:pic>
-      <p:cxnSp>
-        <p:nvCxnSpPr>
-          <p:cNvPr id="189" name="Straight Arrow Connector 188">
-            <a:extLst>
-              <a:ext uri="{FF2B5EF4-FFF2-40B4-BE49-F238E27FC236}">
-                <a16:creationId xmlns:a16="http://schemas.microsoft.com/office/drawing/2014/main" id="{BBF7CC61-94A3-BA44-ABF1-030302B2BC29}"/>
-              </a:ext>
-            </a:extLst>
-          </p:cNvPr>
-          <p:cNvCxnSpPr>
-            <a:cxnSpLocks/>
-            <a:stCxn id="138" idx="3"/>
-            <a:endCxn id="203" idx="1"/>
-          </p:cNvCxnSpPr>
-          <p:nvPr/>
-        </p:nvCxnSpPr>
-        <p:spPr>
-          <a:xfrm flipV="1">
-            <a:off x="6061996" y="2649328"/>
-            <a:ext cx="2496400" cy="15725"/>
-          </a:xfrm>
-          <a:prstGeom prst="straightConnector1">
-            <a:avLst/>
-          </a:prstGeom>
-          <a:ln w="12700">
-            <a:solidFill>
-              <a:schemeClr val="bg1">
-                <a:lumMod val="25000"/>
-              </a:schemeClr>
-            </a:solidFill>
-            <a:headEnd type="arrow" w="med" len="sm"/>
-            <a:tailEnd type="none" w="med" len="sm"/>
-          </a:ln>
-        </p:spPr>
-        <p:style>
-          <a:lnRef idx="1">
-            <a:schemeClr val="accent1"/>
-          </a:lnRef>
-          <a:fillRef idx="0">
-            <a:schemeClr val="accent1"/>
-          </a:fillRef>
-          <a:effectRef idx="0">
-            <a:schemeClr val="accent1"/>
-          </a:effectRef>
-          <a:fontRef idx="minor">
-            <a:schemeClr val="tx1"/>
-          </a:fontRef>
-        </p:style>
-      </p:cxnSp>
       <p:sp>
         <p:nvSpPr>
           <p:cNvPr id="191" name="Rectangle 190">
@@ -12090,80 +11753,6 @@
                 <a:cs typeface="Arial" panose="020B0604020202020204" pitchFamily="34" charset="0"/>
               </a:rPr>
               <a:t>PLCs</a:t>
-            </a:r>
-          </a:p>
-        </p:txBody>
-      </p:sp>
-      <p:sp>
-        <p:nvSpPr>
-          <p:cNvPr id="192" name="Rectangle 191">
-            <a:extLst>
-              <a:ext uri="{FF2B5EF4-FFF2-40B4-BE49-F238E27FC236}">
-                <a16:creationId xmlns:a16="http://schemas.microsoft.com/office/drawing/2014/main" id="{8B4912DE-30E4-9342-BCA3-E457ED3BE1FB}"/>
-              </a:ext>
-            </a:extLst>
-          </p:cNvPr>
-          <p:cNvSpPr/>
-          <p:nvPr/>
-        </p:nvSpPr>
-        <p:spPr>
-          <a:xfrm>
-            <a:off x="9231104" y="5821767"/>
-            <a:ext cx="2119226" cy="461665"/>
-          </a:xfrm>
-          <a:prstGeom prst="rect">
-            <a:avLst/>
-          </a:prstGeom>
-        </p:spPr>
-        <p:txBody>
-          <a:bodyPr wrap="square">
-            <a:spAutoFit/>
-          </a:bodyPr>
-          <a:lstStyle/>
-          <a:p>
-            <a:pPr algn="ctr" defTabSz="1096933" fontAlgn="base">
-              <a:spcBef>
-                <a:spcPct val="0"/>
-              </a:spcBef>
-              <a:spcAft>
-                <a:spcPct val="0"/>
-              </a:spcAft>
-              <a:defRPr/>
-            </a:pPr>
-            <a:r>
-              <a:rPr lang="en-US" sz="1200" dirty="0" smtClean="0">
-                <a:latin typeface="Arial" panose="020B0604020202020204" pitchFamily="34" charset="0"/>
-                <a:ea typeface="Amazon Ember" panose="020B0603020204020204" pitchFamily="34" charset="0"/>
-                <a:cs typeface="Arial" panose="020B0604020202020204" pitchFamily="34" charset="0"/>
-              </a:rPr>
-              <a:t>S3 </a:t>
-            </a:r>
-            <a:r>
-              <a:rPr lang="en-US" sz="1200" dirty="0">
-                <a:latin typeface="Arial" panose="020B0604020202020204" pitchFamily="34" charset="0"/>
-                <a:ea typeface="Amazon Ember" panose="020B0603020204020204" pitchFamily="34" charset="0"/>
-                <a:cs typeface="Arial" panose="020B0604020202020204" pitchFamily="34" charset="0"/>
-              </a:rPr>
-              <a:t>+ Lambda</a:t>
-            </a:r>
-          </a:p>
-          <a:p>
-            <a:pPr algn="ctr" fontAlgn="base">
-              <a:spcBef>
-                <a:spcPct val="0"/>
-              </a:spcBef>
-              <a:spcAft>
-                <a:spcPct val="0"/>
-              </a:spcAft>
-              <a:defRPr/>
-            </a:pPr>
-            <a:r>
-              <a:rPr lang="en-US" sz="1100" dirty="0">
-                <a:latin typeface="Arial" panose="020B0604020202020204" pitchFamily="34" charset="0"/>
-                <a:ea typeface="Amazon Ember" panose="020B0603020204020204" pitchFamily="34" charset="0"/>
-                <a:cs typeface="Arial" panose="020B0604020202020204" pitchFamily="34" charset="0"/>
-              </a:rPr>
-              <a:t>(asset hierarchy modeling)</a:t>
             </a:r>
           </a:p>
         </p:txBody>
@@ -12359,10 +11948,10 @@
           <p:nvPr/>
         </p:nvPicPr>
         <p:blipFill>
-          <a:blip r:embed="rId12">
+          <a:blip r:embed="rId3">
             <a:extLst>
               <a:ext uri="{96DAC541-7B7A-43D3-8B79-37D633B846F1}">
-                <asvg:svgBlip xmlns:asvg="http://schemas.microsoft.com/office/drawing/2016/SVG/main" xmlns="" r:embed="rId13"/>
+                <asvg:svgBlip xmlns="" xmlns:asvg="http://schemas.microsoft.com/office/drawing/2016/SVG/main" r:embed="rId13"/>
               </a:ext>
             </a:extLst>
           </a:blip>
@@ -12398,7 +11987,7 @@
           <a:blip r:embed="rId14">
             <a:extLst>
               <a:ext uri="{96DAC541-7B7A-43D3-8B79-37D633B846F1}">
-                <asvg:svgBlip xmlns:asvg="http://schemas.microsoft.com/office/drawing/2016/SVG/main" xmlns="" r:embed="rId15"/>
+                <asvg:svgBlip xmlns="" xmlns:asvg="http://schemas.microsoft.com/office/drawing/2016/SVG/main" r:embed="rId15"/>
               </a:ext>
             </a:extLst>
           </a:blip>
@@ -12431,10 +12020,10 @@
           <p:nvPr/>
         </p:nvPicPr>
         <p:blipFill>
-          <a:blip r:embed="rId3">
+          <a:blip r:embed="rId16">
             <a:extLst>
               <a:ext uri="{96DAC541-7B7A-43D3-8B79-37D633B846F1}">
-                <asvg:svgBlip xmlns:asvg="http://schemas.microsoft.com/office/drawing/2016/SVG/main" xmlns="" r:embed="rId9"/>
+                <asvg:svgBlip xmlns="" xmlns:asvg="http://schemas.microsoft.com/office/drawing/2016/SVG/main" r:embed="rId9"/>
               </a:ext>
             </a:extLst>
           </a:blip>
@@ -12467,10 +12056,10 @@
           <p:nvPr/>
         </p:nvPicPr>
         <p:blipFill>
-          <a:blip r:embed="rId16">
+          <a:blip r:embed="rId17">
             <a:extLst>
               <a:ext uri="{96DAC541-7B7A-43D3-8B79-37D633B846F1}">
-                <asvg:svgBlip xmlns:asvg="http://schemas.microsoft.com/office/drawing/2016/SVG/main" xmlns="" r:embed="rId17"/>
+                <asvg:svgBlip xmlns="" xmlns:asvg="http://schemas.microsoft.com/office/drawing/2016/SVG/main" r:embed="rId18"/>
               </a:ext>
             </a:extLst>
           </a:blip>
@@ -12503,10 +12092,10 @@
           <p:nvPr/>
         </p:nvPicPr>
         <p:blipFill>
-          <a:blip r:embed="rId18">
+          <a:blip r:embed="rId19">
             <a:extLst>
               <a:ext uri="{96DAC541-7B7A-43D3-8B79-37D633B846F1}">
-                <asvg:svgBlip xmlns:asvg="http://schemas.microsoft.com/office/drawing/2016/SVG/main" xmlns="" r:embed="rId19"/>
+                <asvg:svgBlip xmlns="" xmlns:asvg="http://schemas.microsoft.com/office/drawing/2016/SVG/main" r:embed="rId20"/>
               </a:ext>
             </a:extLst>
           </a:blip>
@@ -12539,10 +12128,10 @@
           <p:nvPr/>
         </p:nvPicPr>
         <p:blipFill>
-          <a:blip r:embed="rId20">
+          <a:blip r:embed="rId21">
             <a:extLst>
               <a:ext uri="{96DAC541-7B7A-43D3-8B79-37D633B846F1}">
-                <asvg:svgBlip xmlns:asvg="http://schemas.microsoft.com/office/drawing/2016/SVG/main" xmlns="" r:embed="rId21"/>
+                <asvg:svgBlip xmlns="" xmlns:asvg="http://schemas.microsoft.com/office/drawing/2016/SVG/main" r:embed="rId22"/>
               </a:ext>
             </a:extLst>
           </a:blip>
@@ -12575,10 +12164,10 @@
           <p:nvPr/>
         </p:nvPicPr>
         <p:blipFill>
-          <a:blip r:embed="rId22">
+          <a:blip r:embed="rId23">
             <a:extLst>
               <a:ext uri="{96DAC541-7B7A-43D3-8B79-37D633B846F1}">
-                <asvg:svgBlip xmlns:asvg="http://schemas.microsoft.com/office/drawing/2016/SVG/main" xmlns="" r:embed="rId23"/>
+                <asvg:svgBlip xmlns="" xmlns:asvg="http://schemas.microsoft.com/office/drawing/2016/SVG/main" r:embed="rId24"/>
               </a:ext>
             </a:extLst>
           </a:blip>
@@ -12611,7 +12200,7 @@
           <p:nvPr/>
         </p:nvPicPr>
         <p:blipFill>
-          <a:blip r:embed="rId24">
+          <a:blip r:embed="rId25">
             <a:extLst>
               <a:ext uri="{28A0092B-C50C-407E-A947-70E740481C1C}">
                 <a14:useLocalDpi xmlns:a14="http://schemas.microsoft.com/office/drawing/2010/main" val="0"/>
@@ -12738,10 +12327,10 @@
           <p:nvPr/>
         </p:nvPicPr>
         <p:blipFill>
-          <a:blip r:embed="rId25">
+          <a:blip r:embed="rId26">
             <a:extLst>
               <a:ext uri="{96DAC541-7B7A-43D3-8B79-37D633B846F1}">
-                <asvg:svgBlip xmlns:asvg="http://schemas.microsoft.com/office/drawing/2016/SVG/main" xmlns="" r:embed="rId28"/>
+                <asvg:svgBlip xmlns="" xmlns:asvg="http://schemas.microsoft.com/office/drawing/2016/SVG/main" r:embed="rId28"/>
               </a:ext>
             </a:extLst>
           </a:blip>
@@ -12815,7 +12404,7 @@
         <p:spPr>
           <a:xfrm>
             <a:off x="4038813" y="2170194"/>
-            <a:ext cx="1956433" cy="461665"/>
+            <a:ext cx="1956433" cy="430887"/>
           </a:xfrm>
           <a:prstGeom prst="rect">
             <a:avLst/>
@@ -12830,45 +12419,31 @@
           <a:p>
             <a:pPr algn="ctr"/>
             <a:r>
-              <a:rPr lang="en-US" sz="1200" dirty="0">
+              <a:rPr lang="en-US" sz="1100" dirty="0">
                 <a:solidFill>
-                  <a:srgbClr val="969696"/>
+                  <a:srgbClr val="5A6B86"/>
                 </a:solidFill>
                 <a:latin typeface="Arial" panose="020B0604020202020204" pitchFamily="34" charset="0"/>
-                <a:ea typeface="Amazon Ember" panose="020B0603020204020204" pitchFamily="34" charset="0"/>
                 <a:cs typeface="Arial" panose="020B0604020202020204" pitchFamily="34" charset="0"/>
               </a:rPr>
               <a:t>Custom Lambda </a:t>
             </a:r>
             <a:r>
-              <a:rPr lang="en-US" sz="1200" dirty="0" smtClean="0">
+              <a:rPr lang="en-US" sz="1100" dirty="0">
                 <a:solidFill>
-                  <a:srgbClr val="969696"/>
+                  <a:srgbClr val="5A6B86"/>
                 </a:solidFill>
                 <a:latin typeface="Arial" panose="020B0604020202020204" pitchFamily="34" charset="0"/>
-                <a:ea typeface="Amazon Ember" panose="020B0603020204020204" pitchFamily="34" charset="0"/>
                 <a:cs typeface="Arial" panose="020B0604020202020204" pitchFamily="34" charset="0"/>
               </a:rPr>
-              <a:t>functions</a:t>
-            </a:r>
-            <a:r>
-              <a:rPr lang="en-US" sz="1100" dirty="0" smtClean="0">
+              <a:t>functions </a:t>
+            </a:r>
+            <a:r>
+              <a:rPr lang="en-US" sz="1100" dirty="0">
                 <a:solidFill>
-                  <a:srgbClr val="969696"/>
+                  <a:srgbClr val="5A6B86"/>
                 </a:solidFill>
                 <a:latin typeface="Arial" panose="020B0604020202020204" pitchFamily="34" charset="0"/>
-                <a:ea typeface="Amazon Ember" panose="020B0603020204020204" pitchFamily="34" charset="0"/>
-                <a:cs typeface="Arial" panose="020B0604020202020204" pitchFamily="34" charset="0"/>
-              </a:rPr>
-              <a:t> </a:t>
-            </a:r>
-            <a:r>
-              <a:rPr lang="en-US" sz="1100" dirty="0">
-                <a:solidFill>
-                  <a:srgbClr val="969696"/>
-                </a:solidFill>
-                <a:latin typeface="Arial" panose="020B0604020202020204" pitchFamily="34" charset="0"/>
-                <a:ea typeface="Amazon Ember" panose="020B0603020204020204" pitchFamily="34" charset="0"/>
                 <a:cs typeface="Arial" panose="020B0604020202020204" pitchFamily="34" charset="0"/>
               </a:rPr>
               <a:t/>
@@ -12876,41 +12451,37 @@
             <a:br>
               <a:rPr lang="en-US" sz="1100" dirty="0">
                 <a:solidFill>
-                  <a:srgbClr val="969696"/>
+                  <a:srgbClr val="5A6B86"/>
                 </a:solidFill>
                 <a:latin typeface="Arial" panose="020B0604020202020204" pitchFamily="34" charset="0"/>
-                <a:ea typeface="Amazon Ember" panose="020B0603020204020204" pitchFamily="34" charset="0"/>
                 <a:cs typeface="Arial" panose="020B0604020202020204" pitchFamily="34" charset="0"/>
               </a:rPr>
             </a:br>
             <a:r>
               <a:rPr lang="en-US" sz="1100" dirty="0">
                 <a:solidFill>
-                  <a:srgbClr val="969696"/>
+                  <a:srgbClr val="5A6B86"/>
                 </a:solidFill>
                 <a:latin typeface="Arial" panose="020B0604020202020204" pitchFamily="34" charset="0"/>
-                <a:ea typeface="Amazon Ember" panose="020B0603020204020204" pitchFamily="34" charset="0"/>
                 <a:cs typeface="Arial" panose="020B0604020202020204" pitchFamily="34" charset="0"/>
               </a:rPr>
               <a:t>(ML inference, ETL, etc</a:t>
             </a:r>
             <a:r>
-              <a:rPr lang="en-US" sz="1100" dirty="0" smtClean="0">
+              <a:rPr lang="en-US" sz="1100" dirty="0">
                 <a:solidFill>
-                  <a:srgbClr val="969696"/>
+                  <a:srgbClr val="5A6B86"/>
                 </a:solidFill>
                 <a:latin typeface="Arial" panose="020B0604020202020204" pitchFamily="34" charset="0"/>
-                <a:ea typeface="Amazon Ember" panose="020B0603020204020204" pitchFamily="34" charset="0"/>
                 <a:cs typeface="Arial" panose="020B0604020202020204" pitchFamily="34" charset="0"/>
               </a:rPr>
               <a:t>.)</a:t>
             </a:r>
             <a:endParaRPr lang="en-US" sz="1100" dirty="0">
               <a:solidFill>
-                <a:srgbClr val="969696"/>
+                <a:srgbClr val="5A6B86"/>
               </a:solidFill>
               <a:latin typeface="Arial" panose="020B0604020202020204" pitchFamily="34" charset="0"/>
-              <a:ea typeface="Amazon Ember" panose="020B0603020204020204" pitchFamily="34" charset="0"/>
               <a:cs typeface="Arial" panose="020B0604020202020204" pitchFamily="34" charset="0"/>
             </a:endParaRPr>
           </a:p>
@@ -13052,51 +12623,6 @@
           </a:fontRef>
         </p:style>
       </p:cxnSp>
-      <p:sp>
-        <p:nvSpPr>
-          <p:cNvPr id="196" name="TextBox 195"/>
-          <p:cNvSpPr txBox="1"/>
-          <p:nvPr/>
-        </p:nvSpPr>
-        <p:spPr>
-          <a:xfrm>
-            <a:off x="9290471" y="4849244"/>
-            <a:ext cx="1956433" cy="276999"/>
-          </a:xfrm>
-          <a:prstGeom prst="rect">
-            <a:avLst/>
-          </a:prstGeom>
-          <a:noFill/>
-        </p:spPr>
-        <p:txBody>
-          <a:bodyPr wrap="square" rtlCol="0">
-            <a:spAutoFit/>
-          </a:bodyPr>
-          <a:lstStyle/>
-          <a:p>
-            <a:pPr algn="ctr"/>
-            <a:r>
-              <a:rPr lang="en-US" sz="1200" dirty="0" smtClean="0">
-                <a:solidFill>
-                  <a:srgbClr val="969696"/>
-                </a:solidFill>
-                <a:latin typeface="Arial" panose="020B0604020202020204" pitchFamily="34" charset="0"/>
-                <a:ea typeface="Amazon Ember" panose="020B0603020204020204" pitchFamily="34" charset="0"/>
-                <a:cs typeface="Arial" panose="020B0604020202020204" pitchFamily="34" charset="0"/>
-              </a:rPr>
-              <a:t>Asset Model Converter</a:t>
-            </a:r>
-            <a:endParaRPr lang="en-US" sz="1200" dirty="0">
-              <a:solidFill>
-                <a:srgbClr val="969696"/>
-              </a:solidFill>
-              <a:latin typeface="Arial" panose="020B0604020202020204" pitchFamily="34" charset="0"/>
-              <a:ea typeface="Amazon Ember" panose="020B0603020204020204" pitchFamily="34" charset="0"/>
-              <a:cs typeface="Arial" panose="020B0604020202020204" pitchFamily="34" charset="0"/>
-            </a:endParaRPr>
-          </a:p>
-        </p:txBody>
-      </p:sp>
       <p:cxnSp>
         <p:nvCxnSpPr>
           <p:cNvPr id="126" name="Straight Connector 125"/>
@@ -14506,7 +14032,7 @@
           <a:blip r:embed="rId32">
             <a:extLst>
               <a:ext uri="{96DAC541-7B7A-43D3-8B79-37D633B846F1}">
-                <asvg:svgBlip xmlns:asvg="http://schemas.microsoft.com/office/drawing/2016/SVG/main" xmlns="" r:embed="rId33"/>
+                <asvg:svgBlip xmlns="" xmlns:asvg="http://schemas.microsoft.com/office/drawing/2016/SVG/main" r:embed="rId33"/>
               </a:ext>
             </a:extLst>
           </a:blip>
@@ -14524,6 +14050,582 @@
           </a:prstGeom>
         </p:spPr>
       </p:pic>
+      <p:cxnSp>
+        <p:nvCxnSpPr>
+          <p:cNvPr id="136" name="Straight Arrow Connector 135">
+            <a:extLst>
+              <a:ext uri="{FF2B5EF4-FFF2-40B4-BE49-F238E27FC236}">
+                <a16:creationId xmlns:a16="http://schemas.microsoft.com/office/drawing/2014/main" id="{0A59238E-FEEB-C84D-82B4-5FAFE96CFDD5}"/>
+              </a:ext>
+            </a:extLst>
+          </p:cNvPr>
+          <p:cNvCxnSpPr>
+            <a:cxnSpLocks/>
+          </p:cNvCxnSpPr>
+          <p:nvPr/>
+        </p:nvCxnSpPr>
+        <p:spPr>
+          <a:xfrm>
+            <a:off x="8073239" y="5425712"/>
+            <a:ext cx="568557" cy="3325"/>
+          </a:xfrm>
+          <a:prstGeom prst="straightConnector1">
+            <a:avLst/>
+          </a:prstGeom>
+          <a:ln w="12700">
+            <a:solidFill>
+              <a:schemeClr val="bg1">
+                <a:lumMod val="25000"/>
+              </a:schemeClr>
+            </a:solidFill>
+            <a:prstDash val="sysDot"/>
+            <a:headEnd type="arrow" w="med" len="sm"/>
+            <a:tailEnd type="none" w="med" len="sm"/>
+          </a:ln>
+        </p:spPr>
+        <p:style>
+          <a:lnRef idx="1">
+            <a:schemeClr val="accent1"/>
+          </a:lnRef>
+          <a:fillRef idx="0">
+            <a:schemeClr val="accent1"/>
+          </a:fillRef>
+          <a:effectRef idx="0">
+            <a:schemeClr val="accent1"/>
+          </a:effectRef>
+          <a:fontRef idx="minor">
+            <a:schemeClr val="tx1"/>
+          </a:fontRef>
+        </p:style>
+      </p:cxnSp>
+      <p:sp>
+        <p:nvSpPr>
+          <p:cNvPr id="137" name="Rectangle 136">
+            <a:extLst>
+              <a:ext uri="{FF2B5EF4-FFF2-40B4-BE49-F238E27FC236}">
+                <a16:creationId xmlns:a16="http://schemas.microsoft.com/office/drawing/2014/main" id="{6C885C74-9C58-7A41-A997-93D658A1C9A3}"/>
+              </a:ext>
+            </a:extLst>
+          </p:cNvPr>
+          <p:cNvSpPr/>
+          <p:nvPr/>
+        </p:nvSpPr>
+        <p:spPr>
+          <a:xfrm>
+            <a:off x="8608332" y="4756277"/>
+            <a:ext cx="3292363" cy="1341920"/>
+          </a:xfrm>
+          <a:prstGeom prst="rect">
+            <a:avLst/>
+          </a:prstGeom>
+          <a:solidFill>
+            <a:schemeClr val="bg1"/>
+          </a:solidFill>
+          <a:ln w="12700">
+            <a:solidFill>
+              <a:srgbClr val="5A6B86"/>
+            </a:solidFill>
+            <a:prstDash val="dash"/>
+          </a:ln>
+        </p:spPr>
+        <p:style>
+          <a:lnRef idx="2">
+            <a:schemeClr val="accent1">
+              <a:shade val="50000"/>
+            </a:schemeClr>
+          </a:lnRef>
+          <a:fillRef idx="1">
+            <a:schemeClr val="accent1"/>
+          </a:fillRef>
+          <a:effectRef idx="0">
+            <a:schemeClr val="accent1"/>
+          </a:effectRef>
+          <a:fontRef idx="minor">
+            <a:schemeClr val="lt1"/>
+          </a:fontRef>
+        </p:style>
+        <p:txBody>
+          <a:bodyPr rot="0" spcFirstLastPara="0" vertOverflow="overflow" horzOverflow="overflow" vert="horz" wrap="square" lIns="146304" tIns="146304" rIns="146304" bIns="73152" numCol="1" spcCol="0" rtlCol="0" fromWordArt="0" anchor="t" anchorCtr="0" forceAA="0" compatLnSpc="1">
+            <a:prstTxWarp prst="textNoShape">
+              <a:avLst/>
+            </a:prstTxWarp>
+            <a:noAutofit/>
+          </a:bodyPr>
+          <a:lstStyle/>
+          <a:p>
+            <a:pPr algn="ctr"/>
+            <a:endParaRPr lang="en-US" sz="1200" dirty="0">
+              <a:solidFill>
+                <a:schemeClr val="tx1"/>
+              </a:solidFill>
+              <a:latin typeface="Arial" panose="020B0604020202020204" pitchFamily="34" charset="0"/>
+              <a:ea typeface="Amazon Ember" panose="020B0603020204020204" pitchFamily="34" charset="0"/>
+              <a:cs typeface="Arial" panose="020B0604020202020204" pitchFamily="34" charset="0"/>
+            </a:endParaRPr>
+          </a:p>
+        </p:txBody>
+      </p:sp>
+      <p:sp>
+        <p:nvSpPr>
+          <p:cNvPr id="158" name="Rectangle 157">
+            <a:extLst>
+              <a:ext uri="{FF2B5EF4-FFF2-40B4-BE49-F238E27FC236}">
+                <a16:creationId xmlns:a16="http://schemas.microsoft.com/office/drawing/2014/main" id="{547AD1BB-2848-A343-81F7-C0220B4EC2BA}"/>
+              </a:ext>
+            </a:extLst>
+          </p:cNvPr>
+          <p:cNvSpPr/>
+          <p:nvPr/>
+        </p:nvSpPr>
+        <p:spPr>
+          <a:xfrm>
+            <a:off x="8687349" y="5309934"/>
+            <a:ext cx="1731340" cy="587805"/>
+          </a:xfrm>
+          <a:prstGeom prst="rect">
+            <a:avLst/>
+          </a:prstGeom>
+          <a:noFill/>
+          <a:ln>
+            <a:solidFill>
+              <a:srgbClr val="404040"/>
+            </a:solidFill>
+          </a:ln>
+          <a:effectLst/>
+        </p:spPr>
+        <p:style>
+          <a:lnRef idx="1">
+            <a:schemeClr val="accent1"/>
+          </a:lnRef>
+          <a:fillRef idx="3">
+            <a:schemeClr val="accent1"/>
+          </a:fillRef>
+          <a:effectRef idx="2">
+            <a:schemeClr val="accent1"/>
+          </a:effectRef>
+          <a:fontRef idx="minor">
+            <a:schemeClr val="lt1"/>
+          </a:fontRef>
+        </p:style>
+        <p:txBody>
+          <a:bodyPr rtlCol="0" anchor="t"/>
+          <a:lstStyle/>
+          <a:p>
+            <a:pPr algn="ctr"/>
+            <a:r>
+              <a:rPr lang="en-US" sz="1100" dirty="0" smtClean="0">
+                <a:solidFill>
+                  <a:schemeClr val="tx1"/>
+                </a:solidFill>
+                <a:latin typeface="Arial" panose="020B0604020202020204" pitchFamily="34" charset="0"/>
+                <a:ea typeface="Amazon Ember" panose="020B0603020204020204" pitchFamily="34" charset="0"/>
+                <a:cs typeface="Arial" panose="020B0604020202020204" pitchFamily="34" charset="0"/>
+              </a:rPr>
+              <a:t>Edge application (Ignition, KEPServerEX) </a:t>
+            </a:r>
+            <a:r>
+              <a:rPr lang="en-US" sz="1100" dirty="0">
+                <a:solidFill>
+                  <a:schemeClr val="tx1"/>
+                </a:solidFill>
+                <a:latin typeface="Arial" panose="020B0604020202020204" pitchFamily="34" charset="0"/>
+                <a:ea typeface="Amazon Ember" panose="020B0603020204020204" pitchFamily="34" charset="0"/>
+                <a:cs typeface="Arial" panose="020B0604020202020204" pitchFamily="34" charset="0"/>
+              </a:rPr>
+              <a:t>tag hierar</a:t>
+            </a:r>
+            <a:r>
+              <a:rPr lang="en-US" sz="1100" dirty="0" smtClean="0">
+                <a:solidFill>
+                  <a:schemeClr val="tx1"/>
+                </a:solidFill>
+                <a:latin typeface="Arial" panose="020B0604020202020204" pitchFamily="34" charset="0"/>
+                <a:ea typeface="Amazon Ember" panose="020B0603020204020204" pitchFamily="34" charset="0"/>
+                <a:cs typeface="Arial" panose="020B0604020202020204" pitchFamily="34" charset="0"/>
+              </a:rPr>
+              <a:t>chy</a:t>
+            </a:r>
+            <a:endParaRPr lang="en-US" sz="1100" dirty="0">
+              <a:solidFill>
+                <a:schemeClr val="tx1"/>
+              </a:solidFill>
+              <a:latin typeface="Arial" panose="020B0604020202020204" pitchFamily="34" charset="0"/>
+              <a:ea typeface="Amazon Ember" panose="020B0603020204020204" pitchFamily="34" charset="0"/>
+              <a:cs typeface="Arial" panose="020B0604020202020204" pitchFamily="34" charset="0"/>
+            </a:endParaRPr>
+          </a:p>
+        </p:txBody>
+      </p:sp>
+      <p:sp>
+        <p:nvSpPr>
+          <p:cNvPr id="159" name="Rectangle 158">
+            <a:extLst>
+              <a:ext uri="{FF2B5EF4-FFF2-40B4-BE49-F238E27FC236}">
+                <a16:creationId xmlns:a16="http://schemas.microsoft.com/office/drawing/2014/main" id="{A2476832-C43B-D041-92DB-71A2FF779890}"/>
+              </a:ext>
+            </a:extLst>
+          </p:cNvPr>
+          <p:cNvSpPr/>
+          <p:nvPr/>
+        </p:nvSpPr>
+        <p:spPr>
+          <a:xfrm>
+            <a:off x="10554396" y="5309935"/>
+            <a:ext cx="763796" cy="587804"/>
+          </a:xfrm>
+          <a:prstGeom prst="rect">
+            <a:avLst/>
+          </a:prstGeom>
+          <a:noFill/>
+          <a:ln>
+            <a:solidFill>
+              <a:schemeClr val="tx1"/>
+            </a:solidFill>
+          </a:ln>
+          <a:effectLst/>
+        </p:spPr>
+        <p:style>
+          <a:lnRef idx="1">
+            <a:schemeClr val="accent1"/>
+          </a:lnRef>
+          <a:fillRef idx="3">
+            <a:schemeClr val="accent1"/>
+          </a:fillRef>
+          <a:effectRef idx="2">
+            <a:schemeClr val="accent1"/>
+          </a:effectRef>
+          <a:fontRef idx="minor">
+            <a:schemeClr val="lt1"/>
+          </a:fontRef>
+        </p:style>
+        <p:txBody>
+          <a:bodyPr rtlCol="0" anchor="t"/>
+          <a:lstStyle/>
+          <a:p>
+            <a:pPr algn="ctr"/>
+            <a:r>
+              <a:rPr lang="en-US" sz="1100" dirty="0">
+                <a:solidFill>
+                  <a:schemeClr val="tx1"/>
+                </a:solidFill>
+                <a:latin typeface="Arial" panose="020B0604020202020204" pitchFamily="34" charset="0"/>
+                <a:ea typeface="Amazon Ember" panose="020B0603020204020204" pitchFamily="34" charset="0"/>
+                <a:cs typeface="Arial" panose="020B0604020202020204" pitchFamily="34" charset="0"/>
+              </a:rPr>
+              <a:t>SiteWise asset hierarchy</a:t>
+            </a:r>
+          </a:p>
+        </p:txBody>
+      </p:sp>
+      <p:cxnSp>
+        <p:nvCxnSpPr>
+          <p:cNvPr id="160" name="Straight Arrow Connector 159">
+            <a:extLst>
+              <a:ext uri="{FF2B5EF4-FFF2-40B4-BE49-F238E27FC236}">
+                <a16:creationId xmlns:a16="http://schemas.microsoft.com/office/drawing/2014/main" id="{0FFCEBE0-98EB-EF40-AEFF-0819513AEDAD}"/>
+              </a:ext>
+            </a:extLst>
+          </p:cNvPr>
+          <p:cNvCxnSpPr>
+            <a:cxnSpLocks/>
+            <a:endCxn id="158" idx="3"/>
+          </p:cNvCxnSpPr>
+          <p:nvPr/>
+        </p:nvCxnSpPr>
+        <p:spPr>
+          <a:xfrm flipH="1">
+            <a:off x="10418689" y="5603837"/>
+            <a:ext cx="143328" cy="0"/>
+          </a:xfrm>
+          <a:prstGeom prst="straightConnector1">
+            <a:avLst/>
+          </a:prstGeom>
+          <a:ln w="12700">
+            <a:solidFill>
+              <a:schemeClr val="bg1">
+                <a:lumMod val="25000"/>
+              </a:schemeClr>
+            </a:solidFill>
+            <a:headEnd type="arrow" w="med" len="sm"/>
+            <a:tailEnd type="none" w="med" len="sm"/>
+          </a:ln>
+        </p:spPr>
+        <p:style>
+          <a:lnRef idx="1">
+            <a:schemeClr val="accent1"/>
+          </a:lnRef>
+          <a:fillRef idx="0">
+            <a:schemeClr val="accent1"/>
+          </a:fillRef>
+          <a:effectRef idx="0">
+            <a:schemeClr val="accent1"/>
+          </a:effectRef>
+          <a:fontRef idx="minor">
+            <a:schemeClr val="tx1"/>
+          </a:fontRef>
+        </p:style>
+      </p:cxnSp>
+      <p:pic>
+        <p:nvPicPr>
+          <p:cNvPr id="162" name="Graphic 184">
+            <a:extLst>
+              <a:ext uri="{FF2B5EF4-FFF2-40B4-BE49-F238E27FC236}">
+                <a16:creationId xmlns:a16="http://schemas.microsoft.com/office/drawing/2014/main" id="{537287BB-EA8A-5D48-A976-5EA0D36D7D7F}"/>
+              </a:ext>
+            </a:extLst>
+          </p:cNvPr>
+          <p:cNvPicPr>
+            <a:picLocks noChangeAspect="1"/>
+          </p:cNvPicPr>
+          <p:nvPr/>
+        </p:nvPicPr>
+        <p:blipFill>
+          <a:blip r:embed="rId16">
+            <a:extLst>
+              <a:ext uri="{96DAC541-7B7A-43D3-8B79-37D633B846F1}">
+                <asvg:svgBlip xmlns="" xmlns:asvg="http://schemas.microsoft.com/office/drawing/2016/SVG/main" r:embed="rId34"/>
+              </a:ext>
+            </a:extLst>
+          </a:blip>
+          <a:stretch>
+            <a:fillRect/>
+          </a:stretch>
+        </p:blipFill>
+        <p:spPr>
+          <a:xfrm>
+            <a:off x="11402048" y="4809642"/>
+            <a:ext cx="432000" cy="432000"/>
+          </a:xfrm>
+          <a:prstGeom prst="rect">
+            <a:avLst/>
+          </a:prstGeom>
+        </p:spPr>
+      </p:pic>
+      <p:pic>
+        <p:nvPicPr>
+          <p:cNvPr id="163" name="Graphic 185">
+            <a:extLst>
+              <a:ext uri="{FF2B5EF4-FFF2-40B4-BE49-F238E27FC236}">
+                <a16:creationId xmlns:a16="http://schemas.microsoft.com/office/drawing/2014/main" id="{D897B21E-6937-904D-9DAB-2E95DBBC75FF}"/>
+              </a:ext>
+            </a:extLst>
+          </p:cNvPr>
+          <p:cNvPicPr>
+            <a:picLocks noChangeAspect="1"/>
+          </p:cNvPicPr>
+          <p:nvPr/>
+        </p:nvPicPr>
+        <p:blipFill>
+          <a:blip r:embed="rId35">
+            <a:extLst>
+              <a:ext uri="{96DAC541-7B7A-43D3-8B79-37D633B846F1}">
+                <asvg:svgBlip xmlns="" xmlns:asvg="http://schemas.microsoft.com/office/drawing/2016/SVG/main" r:embed="rId11"/>
+              </a:ext>
+            </a:extLst>
+          </a:blip>
+          <a:stretch>
+            <a:fillRect/>
+          </a:stretch>
+        </p:blipFill>
+        <p:spPr>
+          <a:xfrm>
+            <a:off x="11402048" y="5475136"/>
+            <a:ext cx="429744" cy="429744"/>
+          </a:xfrm>
+          <a:prstGeom prst="rect">
+            <a:avLst/>
+          </a:prstGeom>
+        </p:spPr>
+      </p:pic>
+      <p:sp>
+        <p:nvSpPr>
+          <p:cNvPr id="167" name="Rectangle 166">
+            <a:extLst>
+              <a:ext uri="{FF2B5EF4-FFF2-40B4-BE49-F238E27FC236}">
+                <a16:creationId xmlns:a16="http://schemas.microsoft.com/office/drawing/2014/main" id="{8B4912DE-30E4-9342-BCA3-E457ED3BE1FB}"/>
+              </a:ext>
+            </a:extLst>
+          </p:cNvPr>
+          <p:cNvSpPr/>
+          <p:nvPr/>
+        </p:nvSpPr>
+        <p:spPr>
+          <a:xfrm>
+            <a:off x="11398082" y="5216032"/>
+            <a:ext cx="430210" cy="261610"/>
+          </a:xfrm>
+          <a:prstGeom prst="rect">
+            <a:avLst/>
+          </a:prstGeom>
+        </p:spPr>
+        <p:txBody>
+          <a:bodyPr wrap="square">
+            <a:spAutoFit/>
+          </a:bodyPr>
+          <a:lstStyle/>
+          <a:p>
+            <a:pPr algn="ctr" defTabSz="1096933" fontAlgn="base">
+              <a:spcBef>
+                <a:spcPct val="0"/>
+              </a:spcBef>
+              <a:spcAft>
+                <a:spcPct val="0"/>
+              </a:spcAft>
+              <a:defRPr/>
+            </a:pPr>
+            <a:r>
+              <a:rPr lang="en-US" sz="1100" dirty="0" smtClean="0">
+                <a:latin typeface="Arial" panose="020B0604020202020204" pitchFamily="34" charset="0"/>
+                <a:ea typeface="Amazon Ember" panose="020B0603020204020204" pitchFamily="34" charset="0"/>
+                <a:cs typeface="Arial" panose="020B0604020202020204" pitchFamily="34" charset="0"/>
+              </a:rPr>
+              <a:t>S3</a:t>
+            </a:r>
+            <a:endParaRPr lang="en-US" sz="1100" dirty="0">
+              <a:latin typeface="Arial" panose="020B0604020202020204" pitchFamily="34" charset="0"/>
+              <a:ea typeface="Amazon Ember" panose="020B0603020204020204" pitchFamily="34" charset="0"/>
+              <a:cs typeface="Arial" panose="020B0604020202020204" pitchFamily="34" charset="0"/>
+            </a:endParaRPr>
+          </a:p>
+        </p:txBody>
+      </p:sp>
+      <p:sp>
+        <p:nvSpPr>
+          <p:cNvPr id="169" name="TextBox 168"/>
+          <p:cNvSpPr txBox="1"/>
+          <p:nvPr/>
+        </p:nvSpPr>
+        <p:spPr>
+          <a:xfrm>
+            <a:off x="9152888" y="4773884"/>
+            <a:ext cx="2166694" cy="430887"/>
+          </a:xfrm>
+          <a:prstGeom prst="rect">
+            <a:avLst/>
+          </a:prstGeom>
+          <a:noFill/>
+        </p:spPr>
+        <p:txBody>
+          <a:bodyPr wrap="square" rtlCol="0">
+            <a:spAutoFit/>
+          </a:bodyPr>
+          <a:lstStyle/>
+          <a:p>
+            <a:pPr algn="ctr"/>
+            <a:r>
+              <a:rPr lang="en-US" sz="1100" dirty="0" smtClean="0">
+                <a:solidFill>
+                  <a:srgbClr val="5A6B86"/>
+                </a:solidFill>
+                <a:latin typeface="Arial" panose="020B0604020202020204" pitchFamily="34" charset="0"/>
+                <a:cs typeface="Arial" panose="020B0604020202020204" pitchFamily="34" charset="0"/>
+              </a:rPr>
+              <a:t>Asset </a:t>
+            </a:r>
+            <a:r>
+              <a:rPr lang="en-US" sz="1100" dirty="0">
+                <a:solidFill>
+                  <a:srgbClr val="5A6B86"/>
+                </a:solidFill>
+                <a:latin typeface="Arial" panose="020B0604020202020204" pitchFamily="34" charset="0"/>
+                <a:cs typeface="Arial" panose="020B0604020202020204" pitchFamily="34" charset="0"/>
+              </a:rPr>
+              <a:t>Model Converter</a:t>
+            </a:r>
+            <a:br>
+              <a:rPr lang="en-US" sz="1100" dirty="0">
+                <a:solidFill>
+                  <a:srgbClr val="5A6B86"/>
+                </a:solidFill>
+                <a:latin typeface="Arial" panose="020B0604020202020204" pitchFamily="34" charset="0"/>
+                <a:cs typeface="Arial" panose="020B0604020202020204" pitchFamily="34" charset="0"/>
+              </a:rPr>
+            </a:br>
+            <a:r>
+              <a:rPr lang="en-US" sz="1100" dirty="0">
+                <a:solidFill>
+                  <a:srgbClr val="5A6B86"/>
+                </a:solidFill>
+                <a:latin typeface="Arial" panose="020B0604020202020204" pitchFamily="34" charset="0"/>
+                <a:cs typeface="Arial" panose="020B0604020202020204" pitchFamily="34" charset="0"/>
+              </a:rPr>
+              <a:t>(</a:t>
+            </a:r>
+            <a:r>
+              <a:rPr lang="en-US" sz="1100" dirty="0" smtClean="0">
+                <a:solidFill>
+                  <a:srgbClr val="5A6B86"/>
+                </a:solidFill>
+                <a:latin typeface="Arial" panose="020B0604020202020204" pitchFamily="34" charset="0"/>
+                <a:cs typeface="Arial" panose="020B0604020202020204" pitchFamily="34" charset="0"/>
+              </a:rPr>
+              <a:t>asset-hierarchy </a:t>
+            </a:r>
+            <a:r>
+              <a:rPr lang="en-US" sz="1100" dirty="0">
+                <a:solidFill>
+                  <a:srgbClr val="5A6B86"/>
+                </a:solidFill>
+                <a:latin typeface="Arial" panose="020B0604020202020204" pitchFamily="34" charset="0"/>
+                <a:cs typeface="Arial" panose="020B0604020202020204" pitchFamily="34" charset="0"/>
+              </a:rPr>
+              <a:t>modeling)</a:t>
+            </a:r>
+          </a:p>
+        </p:txBody>
+      </p:sp>
+      <p:sp>
+        <p:nvSpPr>
+          <p:cNvPr id="170" name="Rectangle 169">
+            <a:extLst>
+              <a:ext uri="{FF2B5EF4-FFF2-40B4-BE49-F238E27FC236}">
+                <a16:creationId xmlns:a16="http://schemas.microsoft.com/office/drawing/2014/main" id="{8B4912DE-30E4-9342-BCA3-E457ED3BE1FB}"/>
+              </a:ext>
+            </a:extLst>
+          </p:cNvPr>
+          <p:cNvSpPr/>
+          <p:nvPr/>
+        </p:nvSpPr>
+        <p:spPr>
+          <a:xfrm>
+            <a:off x="11262830" y="5863211"/>
+            <a:ext cx="700714" cy="261610"/>
+          </a:xfrm>
+          <a:prstGeom prst="rect">
+            <a:avLst/>
+          </a:prstGeom>
+        </p:spPr>
+        <p:txBody>
+          <a:bodyPr wrap="square">
+            <a:spAutoFit/>
+          </a:bodyPr>
+          <a:lstStyle/>
+          <a:p>
+            <a:pPr algn="ctr" defTabSz="1096933" fontAlgn="base">
+              <a:spcBef>
+                <a:spcPct val="0"/>
+              </a:spcBef>
+              <a:spcAft>
+                <a:spcPct val="0"/>
+              </a:spcAft>
+              <a:defRPr/>
+            </a:pPr>
+            <a:r>
+              <a:rPr lang="en-US" sz="1100" dirty="0" smtClean="0">
+                <a:latin typeface="Arial" panose="020B0604020202020204" pitchFamily="34" charset="0"/>
+                <a:ea typeface="Amazon Ember" panose="020B0603020204020204" pitchFamily="34" charset="0"/>
+                <a:cs typeface="Arial" panose="020B0604020202020204" pitchFamily="34" charset="0"/>
+              </a:rPr>
+              <a:t>Lambda</a:t>
+            </a:r>
+            <a:endParaRPr lang="en-US" sz="1100" dirty="0">
+              <a:latin typeface="Arial" panose="020B0604020202020204" pitchFamily="34" charset="0"/>
+              <a:ea typeface="Amazon Ember" panose="020B0603020204020204" pitchFamily="34" charset="0"/>
+              <a:cs typeface="Arial" panose="020B0604020202020204" pitchFamily="34" charset="0"/>
+            </a:endParaRPr>
+          </a:p>
+        </p:txBody>
+      </p:sp>
     </p:spTree>
     <p:extLst>
       <p:ext uri="{BB962C8B-B14F-4D97-AF65-F5344CB8AC3E}">
@@ -14625,7 +14727,7 @@
           <a:blip r:embed="rId2">
             <a:extLst>
               <a:ext uri="{96DAC541-7B7A-43D3-8B79-37D633B846F1}">
-                <asvg:svgBlip xmlns:asvg="http://schemas.microsoft.com/office/drawing/2016/SVG/main" xmlns="" r:embed="rId3"/>
+                <asvg:svgBlip xmlns="" xmlns:asvg="http://schemas.microsoft.com/office/drawing/2016/SVG/main" r:embed="rId3"/>
               </a:ext>
             </a:extLst>
           </a:blip>
@@ -14661,7 +14763,7 @@
           <a:blip r:embed="rId4">
             <a:extLst>
               <a:ext uri="{96DAC541-7B7A-43D3-8B79-37D633B846F1}">
-                <asvg:svgBlip xmlns:asvg="http://schemas.microsoft.com/office/drawing/2016/SVG/main" xmlns="" r:embed="rId5"/>
+                <asvg:svgBlip xmlns="" xmlns:asvg="http://schemas.microsoft.com/office/drawing/2016/SVG/main" r:embed="rId5"/>
               </a:ext>
             </a:extLst>
           </a:blip>
@@ -14753,7 +14855,7 @@
           <a:blip r:embed="rId6">
             <a:extLst>
               <a:ext uri="{96DAC541-7B7A-43D3-8B79-37D633B846F1}">
-                <asvg:svgBlip xmlns:asvg="http://schemas.microsoft.com/office/drawing/2016/SVG/main" xmlns="" r:embed="rId7"/>
+                <asvg:svgBlip xmlns="" xmlns:asvg="http://schemas.microsoft.com/office/drawing/2016/SVG/main" r:embed="rId7"/>
               </a:ext>
             </a:extLst>
           </a:blip>
@@ -14828,7 +14930,7 @@
           <a:blip r:embed="rId8">
             <a:extLst>
               <a:ext uri="{96DAC541-7B7A-43D3-8B79-37D633B846F1}">
-                <asvg:svgBlip xmlns:asvg="http://schemas.microsoft.com/office/drawing/2016/SVG/main" xmlns="" r:embed="rId9"/>
+                <asvg:svgBlip xmlns="" xmlns:asvg="http://schemas.microsoft.com/office/drawing/2016/SVG/main" r:embed="rId9"/>
               </a:ext>
             </a:extLst>
           </a:blip>
@@ -14914,7 +15016,7 @@
           <a:blip r:embed="rId10">
             <a:extLst>
               <a:ext uri="{96DAC541-7B7A-43D3-8B79-37D633B846F1}">
-                <asvg:svgBlip xmlns:asvg="http://schemas.microsoft.com/office/drawing/2016/SVG/main" xmlns="" r:embed="rId11"/>
+                <asvg:svgBlip xmlns="" xmlns:asvg="http://schemas.microsoft.com/office/drawing/2016/SVG/main" r:embed="rId11"/>
               </a:ext>
             </a:extLst>
           </a:blip>
@@ -15010,7 +15112,7 @@
           <a:blip r:embed="rId10">
             <a:extLst>
               <a:ext uri="{96DAC541-7B7A-43D3-8B79-37D633B846F1}">
-                <asvg:svgBlip xmlns:asvg="http://schemas.microsoft.com/office/drawing/2016/SVG/main" xmlns="" r:embed="rId11"/>
+                <asvg:svgBlip xmlns="" xmlns:asvg="http://schemas.microsoft.com/office/drawing/2016/SVG/main" r:embed="rId11"/>
               </a:ext>
             </a:extLst>
           </a:blip>
@@ -15085,7 +15187,7 @@
           <a:blip r:embed="rId12">
             <a:extLst>
               <a:ext uri="{96DAC541-7B7A-43D3-8B79-37D633B846F1}">
-                <asvg:svgBlip xmlns:asvg="http://schemas.microsoft.com/office/drawing/2016/SVG/main" xmlns="" r:embed="rId13"/>
+                <asvg:svgBlip xmlns="" xmlns:asvg="http://schemas.microsoft.com/office/drawing/2016/SVG/main" r:embed="rId13"/>
               </a:ext>
             </a:extLst>
           </a:blip>
@@ -15545,7 +15647,7 @@
           <a:blip r:embed="rId6">
             <a:extLst>
               <a:ext uri="{96DAC541-7B7A-43D3-8B79-37D633B846F1}">
-                <asvg:svgBlip xmlns:asvg="http://schemas.microsoft.com/office/drawing/2016/SVG/main" xmlns="" r:embed="rId7"/>
+                <asvg:svgBlip xmlns="" xmlns:asvg="http://schemas.microsoft.com/office/drawing/2016/SVG/main" r:embed="rId7"/>
               </a:ext>
             </a:extLst>
           </a:blip>
@@ -15754,7 +15856,7 @@
           <a:blip r:embed="rId14">
             <a:extLst>
               <a:ext uri="{96DAC541-7B7A-43D3-8B79-37D633B846F1}">
-                <asvg:svgBlip xmlns:asvg="http://schemas.microsoft.com/office/drawing/2016/SVG/main" xmlns="" r:embed="rId15"/>
+                <asvg:svgBlip xmlns="" xmlns:asvg="http://schemas.microsoft.com/office/drawing/2016/SVG/main" r:embed="rId15"/>
               </a:ext>
             </a:extLst>
           </a:blip>
@@ -17907,7 +18009,7 @@
           <a:blip r:embed="rId2">
             <a:extLst>
               <a:ext uri="{96DAC541-7B7A-43D3-8B79-37D633B846F1}">
-                <asvg:svgBlip xmlns:asvg="http://schemas.microsoft.com/office/drawing/2016/SVG/main" xmlns="" r:embed="rId3"/>
+                <asvg:svgBlip xmlns="" xmlns:asvg="http://schemas.microsoft.com/office/drawing/2016/SVG/main" r:embed="rId3"/>
               </a:ext>
             </a:extLst>
           </a:blip>
@@ -17943,7 +18045,7 @@
           <a:blip r:embed="rId4">
             <a:extLst>
               <a:ext uri="{96DAC541-7B7A-43D3-8B79-37D633B846F1}">
-                <asvg:svgBlip xmlns:asvg="http://schemas.microsoft.com/office/drawing/2016/SVG/main" xmlns="" r:embed="rId5"/>
+                <asvg:svgBlip xmlns="" xmlns:asvg="http://schemas.microsoft.com/office/drawing/2016/SVG/main" r:embed="rId5"/>
               </a:ext>
             </a:extLst>
           </a:blip>
@@ -18015,7 +18117,7 @@
           <a:blip r:embed="rId6">
             <a:extLst>
               <a:ext uri="{96DAC541-7B7A-43D3-8B79-37D633B846F1}">
-                <asvg:svgBlip xmlns:asvg="http://schemas.microsoft.com/office/drawing/2016/SVG/main" xmlns="" r:embed="rId7"/>
+                <asvg:svgBlip xmlns="" xmlns:asvg="http://schemas.microsoft.com/office/drawing/2016/SVG/main" r:embed="rId7"/>
               </a:ext>
             </a:extLst>
           </a:blip>
@@ -18087,7 +18189,7 @@
           <a:blip r:embed="rId8">
             <a:extLst>
               <a:ext uri="{96DAC541-7B7A-43D3-8B79-37D633B846F1}">
-                <asvg:svgBlip xmlns:asvg="http://schemas.microsoft.com/office/drawing/2016/SVG/main" xmlns="" r:embed="rId9"/>
+                <asvg:svgBlip xmlns="" xmlns:asvg="http://schemas.microsoft.com/office/drawing/2016/SVG/main" r:embed="rId9"/>
               </a:ext>
             </a:extLst>
           </a:blip>
@@ -18159,7 +18261,7 @@
           <a:blip r:embed="rId10">
             <a:extLst>
               <a:ext uri="{96DAC541-7B7A-43D3-8B79-37D633B846F1}">
-                <asvg:svgBlip xmlns:asvg="http://schemas.microsoft.com/office/drawing/2016/SVG/main" xmlns="" r:embed="rId11"/>
+                <asvg:svgBlip xmlns="" xmlns:asvg="http://schemas.microsoft.com/office/drawing/2016/SVG/main" r:embed="rId11"/>
               </a:ext>
             </a:extLst>
           </a:blip>
@@ -18285,7 +18387,7 @@
           <a:blip r:embed="rId10">
             <a:extLst>
               <a:ext uri="{96DAC541-7B7A-43D3-8B79-37D633B846F1}">
-                <asvg:svgBlip xmlns:asvg="http://schemas.microsoft.com/office/drawing/2016/SVG/main" xmlns="" r:embed="rId11"/>
+                <asvg:svgBlip xmlns="" xmlns:asvg="http://schemas.microsoft.com/office/drawing/2016/SVG/main" r:embed="rId11"/>
               </a:ext>
             </a:extLst>
           </a:blip>
@@ -18357,7 +18459,7 @@
           <a:blip r:embed="rId12">
             <a:extLst>
               <a:ext uri="{96DAC541-7B7A-43D3-8B79-37D633B846F1}">
-                <asvg:svgBlip xmlns:asvg="http://schemas.microsoft.com/office/drawing/2016/SVG/main" xmlns="" r:embed="rId13"/>
+                <asvg:svgBlip xmlns="" xmlns:asvg="http://schemas.microsoft.com/office/drawing/2016/SVG/main" r:embed="rId13"/>
               </a:ext>
             </a:extLst>
           </a:blip>
@@ -18825,7 +18927,7 @@
           <a:blip r:embed="rId6">
             <a:extLst>
               <a:ext uri="{96DAC541-7B7A-43D3-8B79-37D633B846F1}">
-                <asvg:svgBlip xmlns:asvg="http://schemas.microsoft.com/office/drawing/2016/SVG/main" xmlns="" r:embed="rId7"/>
+                <asvg:svgBlip xmlns="" xmlns:asvg="http://schemas.microsoft.com/office/drawing/2016/SVG/main" r:embed="rId7"/>
               </a:ext>
             </a:extLst>
           </a:blip>
@@ -19559,7 +19661,7 @@
           <a:blip r:embed="rId14">
             <a:extLst>
               <a:ext uri="{96DAC541-7B7A-43D3-8B79-37D633B846F1}">
-                <asvg:svgBlip xmlns:asvg="http://schemas.microsoft.com/office/drawing/2016/SVG/main" xmlns="" r:embed="rId15"/>
+                <asvg:svgBlip xmlns="" xmlns:asvg="http://schemas.microsoft.com/office/drawing/2016/SVG/main" r:embed="rId15"/>
               </a:ext>
             </a:extLst>
           </a:blip>
@@ -20802,7 +20904,7 @@
           <a:blip r:embed="rId2">
             <a:extLst>
               <a:ext uri="{96DAC541-7B7A-43D3-8B79-37D633B846F1}">
-                <asvg:svgBlip xmlns:asvg="http://schemas.microsoft.com/office/drawing/2016/SVG/main" xmlns="" r:embed="rId3"/>
+                <asvg:svgBlip xmlns="" xmlns:asvg="http://schemas.microsoft.com/office/drawing/2016/SVG/main" r:embed="rId3"/>
               </a:ext>
             </a:extLst>
           </a:blip>
@@ -20838,7 +20940,7 @@
           <a:blip r:embed="rId4">
             <a:extLst>
               <a:ext uri="{96DAC541-7B7A-43D3-8B79-37D633B846F1}">
-                <asvg:svgBlip xmlns:asvg="http://schemas.microsoft.com/office/drawing/2016/SVG/main" xmlns="" r:embed="rId5"/>
+                <asvg:svgBlip xmlns="" xmlns:asvg="http://schemas.microsoft.com/office/drawing/2016/SVG/main" r:embed="rId5"/>
               </a:ext>
             </a:extLst>
           </a:blip>
@@ -20910,7 +21012,7 @@
           <a:blip r:embed="rId6">
             <a:extLst>
               <a:ext uri="{96DAC541-7B7A-43D3-8B79-37D633B846F1}">
-                <asvg:svgBlip xmlns:asvg="http://schemas.microsoft.com/office/drawing/2016/SVG/main" xmlns="" r:embed="rId7"/>
+                <asvg:svgBlip xmlns="" xmlns:asvg="http://schemas.microsoft.com/office/drawing/2016/SVG/main" r:embed="rId7"/>
               </a:ext>
             </a:extLst>
           </a:blip>
@@ -20982,7 +21084,7 @@
           <a:blip r:embed="rId8">
             <a:extLst>
               <a:ext uri="{96DAC541-7B7A-43D3-8B79-37D633B846F1}">
-                <asvg:svgBlip xmlns:asvg="http://schemas.microsoft.com/office/drawing/2016/SVG/main" xmlns="" r:embed="rId9"/>
+                <asvg:svgBlip xmlns="" xmlns:asvg="http://schemas.microsoft.com/office/drawing/2016/SVG/main" r:embed="rId9"/>
               </a:ext>
             </a:extLst>
           </a:blip>
@@ -21054,7 +21156,7 @@
           <a:blip r:embed="rId10">
             <a:extLst>
               <a:ext uri="{96DAC541-7B7A-43D3-8B79-37D633B846F1}">
-                <asvg:svgBlip xmlns:asvg="http://schemas.microsoft.com/office/drawing/2016/SVG/main" xmlns="" r:embed="rId11"/>
+                <asvg:svgBlip xmlns="" xmlns:asvg="http://schemas.microsoft.com/office/drawing/2016/SVG/main" r:embed="rId11"/>
               </a:ext>
             </a:extLst>
           </a:blip>
@@ -21180,7 +21282,7 @@
           <a:blip r:embed="rId10">
             <a:extLst>
               <a:ext uri="{96DAC541-7B7A-43D3-8B79-37D633B846F1}">
-                <asvg:svgBlip xmlns:asvg="http://schemas.microsoft.com/office/drawing/2016/SVG/main" xmlns="" r:embed="rId11"/>
+                <asvg:svgBlip xmlns="" xmlns:asvg="http://schemas.microsoft.com/office/drawing/2016/SVG/main" r:embed="rId11"/>
               </a:ext>
             </a:extLst>
           </a:blip>
@@ -21252,7 +21354,7 @@
           <a:blip r:embed="rId12">
             <a:extLst>
               <a:ext uri="{96DAC541-7B7A-43D3-8B79-37D633B846F1}">
-                <asvg:svgBlip xmlns:asvg="http://schemas.microsoft.com/office/drawing/2016/SVG/main" xmlns="" r:embed="rId13"/>
+                <asvg:svgBlip xmlns="" xmlns:asvg="http://schemas.microsoft.com/office/drawing/2016/SVG/main" r:embed="rId13"/>
               </a:ext>
             </a:extLst>
           </a:blip>
@@ -21637,7 +21739,7 @@
           <a:blip r:embed="rId6">
             <a:extLst>
               <a:ext uri="{96DAC541-7B7A-43D3-8B79-37D633B846F1}">
-                <asvg:svgBlip xmlns:asvg="http://schemas.microsoft.com/office/drawing/2016/SVG/main" xmlns="" r:embed="rId7"/>
+                <asvg:svgBlip xmlns="" xmlns:asvg="http://schemas.microsoft.com/office/drawing/2016/SVG/main" r:embed="rId7"/>
               </a:ext>
             </a:extLst>
           </a:blip>
@@ -21827,7 +21929,7 @@
           <a:blip r:embed="rId14">
             <a:extLst>
               <a:ext uri="{96DAC541-7B7A-43D3-8B79-37D633B846F1}">
-                <asvg:svgBlip xmlns:asvg="http://schemas.microsoft.com/office/drawing/2016/SVG/main" xmlns="" r:embed="rId15"/>
+                <asvg:svgBlip xmlns="" xmlns:asvg="http://schemas.microsoft.com/office/drawing/2016/SVG/main" r:embed="rId15"/>
               </a:ext>
             </a:extLst>
           </a:blip>
@@ -24076,7 +24178,7 @@
           <a:blip r:embed="rId2">
             <a:extLst>
               <a:ext uri="{96DAC541-7B7A-43D3-8B79-37D633B846F1}">
-                <asvg:svgBlip xmlns:asvg="http://schemas.microsoft.com/office/drawing/2016/SVG/main" xmlns="" r:embed="rId3"/>
+                <asvg:svgBlip xmlns="" xmlns:asvg="http://schemas.microsoft.com/office/drawing/2016/SVG/main" r:embed="rId3"/>
               </a:ext>
             </a:extLst>
           </a:blip>
@@ -24112,7 +24214,7 @@
           <a:blip r:embed="rId4">
             <a:extLst>
               <a:ext uri="{96DAC541-7B7A-43D3-8B79-37D633B846F1}">
-                <asvg:svgBlip xmlns:asvg="http://schemas.microsoft.com/office/drawing/2016/SVG/main" xmlns="" r:embed="rId5"/>
+                <asvg:svgBlip xmlns="" xmlns:asvg="http://schemas.microsoft.com/office/drawing/2016/SVG/main" r:embed="rId5"/>
               </a:ext>
             </a:extLst>
           </a:blip>
@@ -24184,7 +24286,7 @@
           <a:blip r:embed="rId6">
             <a:extLst>
               <a:ext uri="{96DAC541-7B7A-43D3-8B79-37D633B846F1}">
-                <asvg:svgBlip xmlns:asvg="http://schemas.microsoft.com/office/drawing/2016/SVG/main" xmlns="" r:embed="rId7"/>
+                <asvg:svgBlip xmlns="" xmlns:asvg="http://schemas.microsoft.com/office/drawing/2016/SVG/main" r:embed="rId7"/>
               </a:ext>
             </a:extLst>
           </a:blip>
@@ -24256,7 +24358,7 @@
           <a:blip r:embed="rId8">
             <a:extLst>
               <a:ext uri="{96DAC541-7B7A-43D3-8B79-37D633B846F1}">
-                <asvg:svgBlip xmlns:asvg="http://schemas.microsoft.com/office/drawing/2016/SVG/main" xmlns="" r:embed="rId9"/>
+                <asvg:svgBlip xmlns="" xmlns:asvg="http://schemas.microsoft.com/office/drawing/2016/SVG/main" r:embed="rId9"/>
               </a:ext>
             </a:extLst>
           </a:blip>
@@ -24328,7 +24430,7 @@
           <a:blip r:embed="rId10">
             <a:extLst>
               <a:ext uri="{96DAC541-7B7A-43D3-8B79-37D633B846F1}">
-                <asvg:svgBlip xmlns:asvg="http://schemas.microsoft.com/office/drawing/2016/SVG/main" xmlns="" r:embed="rId11"/>
+                <asvg:svgBlip xmlns="" xmlns:asvg="http://schemas.microsoft.com/office/drawing/2016/SVG/main" r:embed="rId11"/>
               </a:ext>
             </a:extLst>
           </a:blip>
@@ -24454,7 +24556,7 @@
           <a:blip r:embed="rId10">
             <a:extLst>
               <a:ext uri="{96DAC541-7B7A-43D3-8B79-37D633B846F1}">
-                <asvg:svgBlip xmlns:asvg="http://schemas.microsoft.com/office/drawing/2016/SVG/main" xmlns="" r:embed="rId11"/>
+                <asvg:svgBlip xmlns="" xmlns:asvg="http://schemas.microsoft.com/office/drawing/2016/SVG/main" r:embed="rId11"/>
               </a:ext>
             </a:extLst>
           </a:blip>
@@ -24526,7 +24628,7 @@
           <a:blip r:embed="rId12">
             <a:extLst>
               <a:ext uri="{96DAC541-7B7A-43D3-8B79-37D633B846F1}">
-                <asvg:svgBlip xmlns:asvg="http://schemas.microsoft.com/office/drawing/2016/SVG/main" xmlns="" r:embed="rId13"/>
+                <asvg:svgBlip xmlns="" xmlns:asvg="http://schemas.microsoft.com/office/drawing/2016/SVG/main" r:embed="rId13"/>
               </a:ext>
             </a:extLst>
           </a:blip>
@@ -24911,7 +25013,7 @@
           <a:blip r:embed="rId6">
             <a:extLst>
               <a:ext uri="{96DAC541-7B7A-43D3-8B79-37D633B846F1}">
-                <asvg:svgBlip xmlns:asvg="http://schemas.microsoft.com/office/drawing/2016/SVG/main" xmlns="" r:embed="rId7"/>
+                <asvg:svgBlip xmlns="" xmlns:asvg="http://schemas.microsoft.com/office/drawing/2016/SVG/main" r:embed="rId7"/>
               </a:ext>
             </a:extLst>
           </a:blip>
@@ -25101,7 +25203,7 @@
           <a:blip r:embed="rId14">
             <a:extLst>
               <a:ext uri="{96DAC541-7B7A-43D3-8B79-37D633B846F1}">
-                <asvg:svgBlip xmlns:asvg="http://schemas.microsoft.com/office/drawing/2016/SVG/main" xmlns="" r:embed="rId15"/>
+                <asvg:svgBlip xmlns="" xmlns:asvg="http://schemas.microsoft.com/office/drawing/2016/SVG/main" r:embed="rId15"/>
               </a:ext>
             </a:extLst>
           </a:blip>

</xml_diff>

<commit_message>
A few more edits per Shivansh
</commit_message>
<xml_diff>
--- a/docs/images/IMC QS images.pptx
+++ b/docs/images/IMC QS images.pptx
@@ -4117,7 +4117,7 @@
           <a:blip r:embed="rId2">
             <a:extLst>
               <a:ext uri="{96DAC541-7B7A-43D3-8B79-37D633B846F1}">
-                <asvg:svgBlip xmlns:asvg="http://schemas.microsoft.com/office/drawing/2016/SVG/main" xmlns="" r:embed="rId15"/>
+                <asvg:svgBlip xmlns="" xmlns:asvg="http://schemas.microsoft.com/office/drawing/2016/SVG/main" r:embed="rId15"/>
               </a:ext>
             </a:extLst>
           </a:blip>
@@ -4287,7 +4287,7 @@
           <a:blip r:embed="rId16">
             <a:extLst>
               <a:ext uri="{96DAC541-7B7A-43D3-8B79-37D633B846F1}">
-                <asvg:svgBlip xmlns:asvg="http://schemas.microsoft.com/office/drawing/2016/SVG/main" xmlns="" r:embed="rId19"/>
+                <asvg:svgBlip xmlns="" xmlns:asvg="http://schemas.microsoft.com/office/drawing/2016/SVG/main" r:embed="rId19"/>
               </a:ext>
             </a:extLst>
           </a:blip>
@@ -4323,7 +4323,7 @@
           <a:blip r:embed="rId20">
             <a:extLst>
               <a:ext uri="{96DAC541-7B7A-43D3-8B79-37D633B846F1}">
-                <asvg:svgBlip xmlns:asvg="http://schemas.microsoft.com/office/drawing/2016/SVG/main" xmlns="" r:embed="rId21"/>
+                <asvg:svgBlip xmlns="" xmlns:asvg="http://schemas.microsoft.com/office/drawing/2016/SVG/main" r:embed="rId21"/>
               </a:ext>
             </a:extLst>
           </a:blip>
@@ -4359,7 +4359,7 @@
           <a:blip r:embed="rId22">
             <a:extLst>
               <a:ext uri="{96DAC541-7B7A-43D3-8B79-37D633B846F1}">
-                <asvg:svgBlip xmlns:asvg="http://schemas.microsoft.com/office/drawing/2016/SVG/main" xmlns="" r:embed="rId23"/>
+                <asvg:svgBlip xmlns="" xmlns:asvg="http://schemas.microsoft.com/office/drawing/2016/SVG/main" r:embed="rId23"/>
               </a:ext>
             </a:extLst>
           </a:blip>
@@ -4529,7 +4529,7 @@
           <a:blip r:embed="rId24">
             <a:extLst>
               <a:ext uri="{96DAC541-7B7A-43D3-8B79-37D633B846F1}">
-                <asvg:svgBlip xmlns:asvg="http://schemas.microsoft.com/office/drawing/2016/SVG/main" xmlns="" r:embed="rId25"/>
+                <asvg:svgBlip xmlns="" xmlns:asvg="http://schemas.microsoft.com/office/drawing/2016/SVG/main" r:embed="rId25"/>
               </a:ext>
             </a:extLst>
           </a:blip>
@@ -4672,7 +4672,7 @@
           <a:blip r:embed="rId24">
             <a:extLst>
               <a:ext uri="{96DAC541-7B7A-43D3-8B79-37D633B846F1}">
-                <asvg:svgBlip xmlns:asvg="http://schemas.microsoft.com/office/drawing/2016/SVG/main" xmlns="" r:embed="rId25"/>
+                <asvg:svgBlip xmlns="" xmlns:asvg="http://schemas.microsoft.com/office/drawing/2016/SVG/main" r:embed="rId25"/>
               </a:ext>
             </a:extLst>
           </a:blip>
@@ -4890,7 +4890,7 @@
           <a:blip r:embed="rId26">
             <a:extLst>
               <a:ext uri="{96DAC541-7B7A-43D3-8B79-37D633B846F1}">
-                <asvg:svgBlip xmlns:asvg="http://schemas.microsoft.com/office/drawing/2016/SVG/main" xmlns="" r:embed="rId28"/>
+                <asvg:svgBlip xmlns="" xmlns:asvg="http://schemas.microsoft.com/office/drawing/2016/SVG/main" r:embed="rId28"/>
               </a:ext>
             </a:extLst>
           </a:blip>
@@ -6196,7 +6196,7 @@
           <a:blip r:embed="rId29">
             <a:extLst>
               <a:ext uri="{96DAC541-7B7A-43D3-8B79-37D633B846F1}">
-                <asvg:svgBlip xmlns:asvg="http://schemas.microsoft.com/office/drawing/2016/SVG/main" xmlns="" r:embed="rId13"/>
+                <asvg:svgBlip xmlns="" xmlns:asvg="http://schemas.microsoft.com/office/drawing/2016/SVG/main" r:embed="rId13"/>
               </a:ext>
             </a:extLst>
           </a:blip>
@@ -6232,7 +6232,7 @@
           <a:blip r:embed="rId30">
             <a:extLst>
               <a:ext uri="{96DAC541-7B7A-43D3-8B79-37D633B846F1}">
-                <asvg:svgBlip xmlns:asvg="http://schemas.microsoft.com/office/drawing/2016/SVG/main" xmlns="" r:embed="rId31"/>
+                <asvg:svgBlip xmlns="" xmlns:asvg="http://schemas.microsoft.com/office/drawing/2016/SVG/main" r:embed="rId31"/>
               </a:ext>
             </a:extLst>
           </a:blip>
@@ -6268,7 +6268,7 @@
           <a:blip r:embed="rId32">
             <a:extLst>
               <a:ext uri="{96DAC541-7B7A-43D3-8B79-37D633B846F1}">
-                <asvg:svgBlip xmlns:asvg="http://schemas.microsoft.com/office/drawing/2016/SVG/main" xmlns="" r:embed="rId9"/>
+                <asvg:svgBlip xmlns="" xmlns:asvg="http://schemas.microsoft.com/office/drawing/2016/SVG/main" r:embed="rId9"/>
               </a:ext>
             </a:extLst>
           </a:blip>
@@ -6304,7 +6304,7 @@
           <a:blip r:embed="rId33">
             <a:extLst>
               <a:ext uri="{96DAC541-7B7A-43D3-8B79-37D633B846F1}">
-                <asvg:svgBlip xmlns:asvg="http://schemas.microsoft.com/office/drawing/2016/SVG/main" xmlns="" r:embed="rId17"/>
+                <asvg:svgBlip xmlns="" xmlns:asvg="http://schemas.microsoft.com/office/drawing/2016/SVG/main" r:embed="rId17"/>
               </a:ext>
             </a:extLst>
           </a:blip>
@@ -6340,7 +6340,7 @@
           <a:blip r:embed="rId34">
             <a:extLst>
               <a:ext uri="{96DAC541-7B7A-43D3-8B79-37D633B846F1}">
-                <asvg:svgBlip xmlns:asvg="http://schemas.microsoft.com/office/drawing/2016/SVG/main" xmlns="" r:embed="rId35"/>
+                <asvg:svgBlip xmlns="" xmlns:asvg="http://schemas.microsoft.com/office/drawing/2016/SVG/main" r:embed="rId35"/>
               </a:ext>
             </a:extLst>
           </a:blip>
@@ -6376,7 +6376,7 @@
           <a:blip r:embed="rId36">
             <a:extLst>
               <a:ext uri="{96DAC541-7B7A-43D3-8B79-37D633B846F1}">
-                <asvg:svgBlip xmlns:asvg="http://schemas.microsoft.com/office/drawing/2016/SVG/main" xmlns="" r:embed="rId37"/>
+                <asvg:svgBlip xmlns="" xmlns:asvg="http://schemas.microsoft.com/office/drawing/2016/SVG/main" r:embed="rId37"/>
               </a:ext>
             </a:extLst>
           </a:blip>
@@ -6732,7 +6732,7 @@
           <a:blip r:embed="rId32">
             <a:extLst>
               <a:ext uri="{96DAC541-7B7A-43D3-8B79-37D633B846F1}">
-                <asvg:svgBlip xmlns:asvg="http://schemas.microsoft.com/office/drawing/2016/SVG/main" xmlns="" r:embed="rId9"/>
+                <asvg:svgBlip xmlns="" xmlns:asvg="http://schemas.microsoft.com/office/drawing/2016/SVG/main" r:embed="rId9"/>
               </a:ext>
             </a:extLst>
           </a:blip>
@@ -6768,7 +6768,7 @@
           <a:blip r:embed="rId38">
             <a:extLst>
               <a:ext uri="{96DAC541-7B7A-43D3-8B79-37D633B846F1}">
-                <asvg:svgBlip xmlns:asvg="http://schemas.microsoft.com/office/drawing/2016/SVG/main" xmlns="" r:embed="rId11"/>
+                <asvg:svgBlip xmlns="" xmlns:asvg="http://schemas.microsoft.com/office/drawing/2016/SVG/main" r:embed="rId11"/>
               </a:ext>
             </a:extLst>
           </a:blip>
@@ -11995,7 +11995,7 @@
           <a:blip r:embed="rId3">
             <a:extLst>
               <a:ext uri="{96DAC541-7B7A-43D3-8B79-37D633B846F1}">
-                <asvg:svgBlip xmlns:asvg="http://schemas.microsoft.com/office/drawing/2016/SVG/main" xmlns="" r:embed="rId13"/>
+                <asvg:svgBlip xmlns="" xmlns:asvg="http://schemas.microsoft.com/office/drawing/2016/SVG/main" r:embed="rId13"/>
               </a:ext>
             </a:extLst>
           </a:blip>
@@ -12031,7 +12031,7 @@
           <a:blip r:embed="rId14">
             <a:extLst>
               <a:ext uri="{96DAC541-7B7A-43D3-8B79-37D633B846F1}">
-                <asvg:svgBlip xmlns:asvg="http://schemas.microsoft.com/office/drawing/2016/SVG/main" xmlns="" r:embed="rId15"/>
+                <asvg:svgBlip xmlns="" xmlns:asvg="http://schemas.microsoft.com/office/drawing/2016/SVG/main" r:embed="rId15"/>
               </a:ext>
             </a:extLst>
           </a:blip>
@@ -12067,7 +12067,7 @@
           <a:blip r:embed="rId16">
             <a:extLst>
               <a:ext uri="{96DAC541-7B7A-43D3-8B79-37D633B846F1}">
-                <asvg:svgBlip xmlns:asvg="http://schemas.microsoft.com/office/drawing/2016/SVG/main" xmlns="" r:embed="rId9"/>
+                <asvg:svgBlip xmlns="" xmlns:asvg="http://schemas.microsoft.com/office/drawing/2016/SVG/main" r:embed="rId9"/>
               </a:ext>
             </a:extLst>
           </a:blip>
@@ -12103,7 +12103,7 @@
           <a:blip r:embed="rId17">
             <a:extLst>
               <a:ext uri="{96DAC541-7B7A-43D3-8B79-37D633B846F1}">
-                <asvg:svgBlip xmlns:asvg="http://schemas.microsoft.com/office/drawing/2016/SVG/main" xmlns="" r:embed="rId18"/>
+                <asvg:svgBlip xmlns="" xmlns:asvg="http://schemas.microsoft.com/office/drawing/2016/SVG/main" r:embed="rId18"/>
               </a:ext>
             </a:extLst>
           </a:blip>
@@ -12139,7 +12139,7 @@
           <a:blip r:embed="rId19">
             <a:extLst>
               <a:ext uri="{96DAC541-7B7A-43D3-8B79-37D633B846F1}">
-                <asvg:svgBlip xmlns:asvg="http://schemas.microsoft.com/office/drawing/2016/SVG/main" xmlns="" r:embed="rId20"/>
+                <asvg:svgBlip xmlns="" xmlns:asvg="http://schemas.microsoft.com/office/drawing/2016/SVG/main" r:embed="rId20"/>
               </a:ext>
             </a:extLst>
           </a:blip>
@@ -12175,7 +12175,7 @@
           <a:blip r:embed="rId21">
             <a:extLst>
               <a:ext uri="{96DAC541-7B7A-43D3-8B79-37D633B846F1}">
-                <asvg:svgBlip xmlns:asvg="http://schemas.microsoft.com/office/drawing/2016/SVG/main" xmlns="" r:embed="rId22"/>
+                <asvg:svgBlip xmlns="" xmlns:asvg="http://schemas.microsoft.com/office/drawing/2016/SVG/main" r:embed="rId22"/>
               </a:ext>
             </a:extLst>
           </a:blip>
@@ -12211,7 +12211,7 @@
           <a:blip r:embed="rId23">
             <a:extLst>
               <a:ext uri="{96DAC541-7B7A-43D3-8B79-37D633B846F1}">
-                <asvg:svgBlip xmlns:asvg="http://schemas.microsoft.com/office/drawing/2016/SVG/main" xmlns="" r:embed="rId24"/>
+                <asvg:svgBlip xmlns="" xmlns:asvg="http://schemas.microsoft.com/office/drawing/2016/SVG/main" r:embed="rId24"/>
               </a:ext>
             </a:extLst>
           </a:blip>
@@ -12390,7 +12390,7 @@
           <a:blip r:embed="rId26">
             <a:extLst>
               <a:ext uri="{96DAC541-7B7A-43D3-8B79-37D633B846F1}">
-                <asvg:svgBlip xmlns:asvg="http://schemas.microsoft.com/office/drawing/2016/SVG/main" xmlns="" r:embed="rId28"/>
+                <asvg:svgBlip xmlns="" xmlns:asvg="http://schemas.microsoft.com/office/drawing/2016/SVG/main" r:embed="rId28"/>
               </a:ext>
             </a:extLst>
           </a:blip>
@@ -13899,7 +13899,7 @@
           <a:blip r:embed="rId32">
             <a:extLst>
               <a:ext uri="{96DAC541-7B7A-43D3-8B79-37D633B846F1}">
-                <asvg:svgBlip xmlns:asvg="http://schemas.microsoft.com/office/drawing/2016/SVG/main" xmlns="" r:embed="rId33"/>
+                <asvg:svgBlip xmlns="" xmlns:asvg="http://schemas.microsoft.com/office/drawing/2016/SVG/main" r:embed="rId33"/>
               </a:ext>
             </a:extLst>
           </a:blip>
@@ -14250,7 +14250,7 @@
           <a:blip r:embed="rId16">
             <a:extLst>
               <a:ext uri="{96DAC541-7B7A-43D3-8B79-37D633B846F1}">
-                <asvg:svgBlip xmlns:asvg="http://schemas.microsoft.com/office/drawing/2016/SVG/main" xmlns="" r:embed="rId34"/>
+                <asvg:svgBlip xmlns="" xmlns:asvg="http://schemas.microsoft.com/office/drawing/2016/SVG/main" r:embed="rId34"/>
               </a:ext>
             </a:extLst>
           </a:blip>
@@ -14286,7 +14286,7 @@
           <a:blip r:embed="rId35">
             <a:extLst>
               <a:ext uri="{96DAC541-7B7A-43D3-8B79-37D633B846F1}">
-                <asvg:svgBlip xmlns:asvg="http://schemas.microsoft.com/office/drawing/2016/SVG/main" xmlns="" r:embed="rId11"/>
+                <asvg:svgBlip xmlns="" xmlns:asvg="http://schemas.microsoft.com/office/drawing/2016/SVG/main" r:embed="rId11"/>
               </a:ext>
             </a:extLst>
           </a:blip>
@@ -14752,7 +14752,7 @@
           <a:blip r:embed="rId2">
             <a:extLst>
               <a:ext uri="{96DAC541-7B7A-43D3-8B79-37D633B846F1}">
-                <asvg:svgBlip xmlns:asvg="http://schemas.microsoft.com/office/drawing/2016/SVG/main" xmlns="" r:embed="rId3"/>
+                <asvg:svgBlip xmlns="" xmlns:asvg="http://schemas.microsoft.com/office/drawing/2016/SVG/main" r:embed="rId3"/>
               </a:ext>
             </a:extLst>
           </a:blip>
@@ -14788,7 +14788,7 @@
           <a:blip r:embed="rId4">
             <a:extLst>
               <a:ext uri="{96DAC541-7B7A-43D3-8B79-37D633B846F1}">
-                <asvg:svgBlip xmlns:asvg="http://schemas.microsoft.com/office/drawing/2016/SVG/main" xmlns="" r:embed="rId5"/>
+                <asvg:svgBlip xmlns="" xmlns:asvg="http://schemas.microsoft.com/office/drawing/2016/SVG/main" r:embed="rId5"/>
               </a:ext>
             </a:extLst>
           </a:blip>
@@ -14880,7 +14880,7 @@
           <a:blip r:embed="rId6">
             <a:extLst>
               <a:ext uri="{96DAC541-7B7A-43D3-8B79-37D633B846F1}">
-                <asvg:svgBlip xmlns:asvg="http://schemas.microsoft.com/office/drawing/2016/SVG/main" xmlns="" r:embed="rId7"/>
+                <asvg:svgBlip xmlns="" xmlns:asvg="http://schemas.microsoft.com/office/drawing/2016/SVG/main" r:embed="rId7"/>
               </a:ext>
             </a:extLst>
           </a:blip>
@@ -14955,7 +14955,7 @@
           <a:blip r:embed="rId8">
             <a:extLst>
               <a:ext uri="{96DAC541-7B7A-43D3-8B79-37D633B846F1}">
-                <asvg:svgBlip xmlns:asvg="http://schemas.microsoft.com/office/drawing/2016/SVG/main" xmlns="" r:embed="rId9"/>
+                <asvg:svgBlip xmlns="" xmlns:asvg="http://schemas.microsoft.com/office/drawing/2016/SVG/main" r:embed="rId9"/>
               </a:ext>
             </a:extLst>
           </a:blip>
@@ -15041,7 +15041,7 @@
           <a:blip r:embed="rId10">
             <a:extLst>
               <a:ext uri="{96DAC541-7B7A-43D3-8B79-37D633B846F1}">
-                <asvg:svgBlip xmlns:asvg="http://schemas.microsoft.com/office/drawing/2016/SVG/main" xmlns="" r:embed="rId11"/>
+                <asvg:svgBlip xmlns="" xmlns:asvg="http://schemas.microsoft.com/office/drawing/2016/SVG/main" r:embed="rId11"/>
               </a:ext>
             </a:extLst>
           </a:blip>
@@ -15137,7 +15137,7 @@
           <a:blip r:embed="rId10">
             <a:extLst>
               <a:ext uri="{96DAC541-7B7A-43D3-8B79-37D633B846F1}">
-                <asvg:svgBlip xmlns:asvg="http://schemas.microsoft.com/office/drawing/2016/SVG/main" xmlns="" r:embed="rId11"/>
+                <asvg:svgBlip xmlns="" xmlns:asvg="http://schemas.microsoft.com/office/drawing/2016/SVG/main" r:embed="rId11"/>
               </a:ext>
             </a:extLst>
           </a:blip>
@@ -15212,7 +15212,7 @@
           <a:blip r:embed="rId12">
             <a:extLst>
               <a:ext uri="{96DAC541-7B7A-43D3-8B79-37D633B846F1}">
-                <asvg:svgBlip xmlns:asvg="http://schemas.microsoft.com/office/drawing/2016/SVG/main" xmlns="" r:embed="rId13"/>
+                <asvg:svgBlip xmlns="" xmlns:asvg="http://schemas.microsoft.com/office/drawing/2016/SVG/main" r:embed="rId13"/>
               </a:ext>
             </a:extLst>
           </a:blip>
@@ -15672,7 +15672,7 @@
           <a:blip r:embed="rId6">
             <a:extLst>
               <a:ext uri="{96DAC541-7B7A-43D3-8B79-37D633B846F1}">
-                <asvg:svgBlip xmlns:asvg="http://schemas.microsoft.com/office/drawing/2016/SVG/main" xmlns="" r:embed="rId7"/>
+                <asvg:svgBlip xmlns="" xmlns:asvg="http://schemas.microsoft.com/office/drawing/2016/SVG/main" r:embed="rId7"/>
               </a:ext>
             </a:extLst>
           </a:blip>
@@ -15881,7 +15881,7 @@
           <a:blip r:embed="rId14">
             <a:extLst>
               <a:ext uri="{96DAC541-7B7A-43D3-8B79-37D633B846F1}">
-                <asvg:svgBlip xmlns:asvg="http://schemas.microsoft.com/office/drawing/2016/SVG/main" xmlns="" r:embed="rId15"/>
+                <asvg:svgBlip xmlns="" xmlns:asvg="http://schemas.microsoft.com/office/drawing/2016/SVG/main" r:embed="rId15"/>
               </a:ext>
             </a:extLst>
           </a:blip>
@@ -19570,7 +19570,16 @@
                 <a:ea typeface="Amazon Ember" charset="0"/>
                 <a:cs typeface="Amazon Ember" charset="0"/>
               </a:rPr>
-              <a:t>Cold and g</a:t>
+              <a:t>Cold and </a:t>
+            </a:r>
+            <a:r>
+              <a:rPr lang="en-US" sz="1200" dirty="0">
+                <a:solidFill>
+                  <a:srgbClr val="1D1C1D"/>
+                </a:solidFill>
+                <a:latin typeface="Slack-Lato"/>
+              </a:rPr>
+              <a:t>Amazon S3 Glacier</a:t>
             </a:r>
             <a:r>
               <a:rPr lang="en-US" sz="1200" dirty="0" smtClean="0">
@@ -19578,7 +19587,7 @@
                 <a:ea typeface="Amazon Ember" charset="0"/>
                 <a:cs typeface="Amazon Ember" charset="0"/>
               </a:rPr>
-              <a:t>lacier </a:t>
+              <a:t> </a:t>
             </a:r>
             <a:r>
               <a:rPr lang="en-US" sz="1200" dirty="0">
@@ -19594,7 +19603,7 @@
                 <a:ea typeface="Amazon Ember" charset="0"/>
                 <a:cs typeface="Amazon Ember" charset="0"/>
               </a:rPr>
-              <a:t>stores.</a:t>
+              <a:t>stores are available.</a:t>
             </a:r>
             <a:endParaRPr lang="en-US" sz="1200" dirty="0">
               <a:latin typeface="Amazon Ember Regular"/>
@@ -23065,7 +23074,7 @@
           <a:blip r:embed="rId5">
             <a:extLst>
               <a:ext uri="{96DAC541-7B7A-43D3-8B79-37D633B846F1}">
-                <asvg:svgBlip xmlns:asvg="http://schemas.microsoft.com/office/drawing/2016/SVG/main" xmlns="" r:embed="rId11"/>
+                <asvg:svgBlip xmlns="" xmlns:asvg="http://schemas.microsoft.com/office/drawing/2016/SVG/main" r:embed="rId11"/>
               </a:ext>
             </a:extLst>
           </a:blip>
@@ -23101,7 +23110,7 @@
           <a:blip r:embed="rId12">
             <a:extLst>
               <a:ext uri="{96DAC541-7B7A-43D3-8B79-37D633B846F1}">
-                <asvg:svgBlip xmlns:asvg="http://schemas.microsoft.com/office/drawing/2016/SVG/main" xmlns="" r:embed="rId15"/>
+                <asvg:svgBlip xmlns="" xmlns:asvg="http://schemas.microsoft.com/office/drawing/2016/SVG/main" r:embed="rId15"/>
               </a:ext>
             </a:extLst>
           </a:blip>
@@ -23540,84 +23549,6 @@
               <a:t>Amazon S3</a:t>
             </a:r>
             <a:endParaRPr kumimoji="0" lang="en-US" sz="1400" b="0" u="none" strike="noStrike" kern="1200" cap="none" spc="0" normalizeH="0" baseline="0" noProof="0" dirty="0">
-              <a:ln>
-                <a:noFill/>
-              </a:ln>
-              <a:effectLst/>
-              <a:uLnTx/>
-              <a:uFillTx/>
-              <a:latin typeface="Amazon Ember"/>
-              <a:ea typeface="+mn-ea"/>
-              <a:cs typeface="+mn-cs"/>
-            </a:endParaRPr>
-          </a:p>
-        </p:txBody>
-      </p:sp>
-      <p:sp>
-        <p:nvSpPr>
-          <p:cNvPr id="40" name="Rectangle 39">
-            <a:extLst>
-              <a:ext uri="{FF2B5EF4-FFF2-40B4-BE49-F238E27FC236}">
-                <a16:creationId xmlns:a16="http://schemas.microsoft.com/office/drawing/2014/main" id="{531F9197-0B83-9048-9C45-5D00F09A21DA}"/>
-              </a:ext>
-            </a:extLst>
-          </p:cNvPr>
-          <p:cNvSpPr/>
-          <p:nvPr/>
-        </p:nvSpPr>
-        <p:spPr>
-          <a:xfrm>
-            <a:off x="1879704" y="373142"/>
-            <a:ext cx="992579" cy="276999"/>
-          </a:xfrm>
-          <a:prstGeom prst="rect">
-            <a:avLst/>
-          </a:prstGeom>
-        </p:spPr>
-        <p:txBody>
-          <a:bodyPr wrap="none">
-            <a:spAutoFit/>
-          </a:bodyPr>
-          <a:lstStyle/>
-          <a:p>
-            <a:pPr marL="0" marR="0" lvl="0" indent="0" algn="l" defTabSz="731520" rtl="0" eaLnBrk="1" fontAlgn="auto" latinLnBrk="0" hangingPunct="1">
-              <a:lnSpc>
-                <a:spcPct val="100000"/>
-              </a:lnSpc>
-              <a:spcBef>
-                <a:spcPts val="0"/>
-              </a:spcBef>
-              <a:spcAft>
-                <a:spcPts val="0"/>
-              </a:spcAft>
-              <a:buClrTx/>
-              <a:buSzTx/>
-              <a:buFontTx/>
-              <a:buNone/>
-              <a:tabLst/>
-              <a:defRPr/>
-            </a:pPr>
-            <a:r>
-              <a:rPr lang="en-US" sz="1200" i="1" dirty="0">
-                <a:latin typeface="Amazon Ember"/>
-              </a:rPr>
-              <a:t>D</a:t>
-            </a:r>
-            <a:r>
-              <a:rPr kumimoji="0" lang="en-US" sz="1200" b="0" i="1" u="none" strike="noStrike" kern="1200" cap="none" spc="0" normalizeH="0" baseline="0" noProof="0" dirty="0" smtClean="0">
-                <a:ln>
-                  <a:noFill/>
-                </a:ln>
-                <a:effectLst/>
-                <a:uLnTx/>
-                <a:uFillTx/>
-                <a:latin typeface="Amazon Ember"/>
-                <a:ea typeface="+mn-ea"/>
-                <a:cs typeface="+mn-cs"/>
-              </a:rPr>
-              <a:t>ashboards</a:t>
-            </a:r>
-            <a:endParaRPr kumimoji="0" lang="en-US" sz="1400" b="0" i="0" u="none" strike="noStrike" kern="1200" cap="none" spc="0" normalizeH="0" baseline="0" noProof="0" dirty="0">
               <a:ln>
                 <a:noFill/>
               </a:ln>
@@ -28331,7 +28262,7 @@
             <a:blip r:embed="rId16">
               <a:extLst>
                 <a:ext uri="{96DAC541-7B7A-43D3-8B79-37D633B846F1}">
-                  <asvg:svgBlip xmlns:asvg="http://schemas.microsoft.com/office/drawing/2016/SVG/main" xmlns="" r:embed="rId17"/>
+                  <asvg:svgBlip xmlns="" xmlns:asvg="http://schemas.microsoft.com/office/drawing/2016/SVG/main" r:embed="rId17"/>
                 </a:ext>
               </a:extLst>
             </a:blip>
@@ -28510,7 +28441,7 @@
             <a:blip r:embed="rId18">
               <a:extLst>
                 <a:ext uri="{96DAC541-7B7A-43D3-8B79-37D633B846F1}">
-                  <asvg:svgBlip xmlns:asvg="http://schemas.microsoft.com/office/drawing/2016/SVG/main" xmlns="" r:embed="rId19"/>
+                  <asvg:svgBlip xmlns="" xmlns:asvg="http://schemas.microsoft.com/office/drawing/2016/SVG/main" r:embed="rId19"/>
                 </a:ext>
               </a:extLst>
             </a:blip>
@@ -28548,7 +28479,7 @@
           <a:blip r:embed="rId18">
             <a:extLst>
               <a:ext uri="{96DAC541-7B7A-43D3-8B79-37D633B846F1}">
-                <asvg:svgBlip xmlns:asvg="http://schemas.microsoft.com/office/drawing/2016/SVG/main" xmlns="" r:embed="rId19"/>
+                <asvg:svgBlip xmlns="" xmlns:asvg="http://schemas.microsoft.com/office/drawing/2016/SVG/main" r:embed="rId19"/>
               </a:ext>
             </a:extLst>
           </a:blip>
@@ -28825,7 +28756,7 @@
           <a:blip r:embed="rId21">
             <a:extLst>
               <a:ext uri="{96DAC541-7B7A-43D3-8B79-37D633B846F1}">
-                <asvg:svgBlip xmlns:asvg="http://schemas.microsoft.com/office/drawing/2016/SVG/main" xmlns="" r:embed="rId22"/>
+                <asvg:svgBlip xmlns="" xmlns:asvg="http://schemas.microsoft.com/office/drawing/2016/SVG/main" r:embed="rId22"/>
               </a:ext>
             </a:extLst>
           </a:blip>
@@ -28861,7 +28792,7 @@
           <a:blip r:embed="rId23">
             <a:extLst>
               <a:ext uri="{96DAC541-7B7A-43D3-8B79-37D633B846F1}">
-                <asvg:svgBlip xmlns:asvg="http://schemas.microsoft.com/office/drawing/2016/SVG/main" xmlns="" r:embed="rId7"/>
+                <asvg:svgBlip xmlns="" xmlns:asvg="http://schemas.microsoft.com/office/drawing/2016/SVG/main" r:embed="rId7"/>
               </a:ext>
             </a:extLst>
           </a:blip>
@@ -28897,7 +28828,7 @@
           <a:blip r:embed="rId23">
             <a:extLst>
               <a:ext uri="{96DAC541-7B7A-43D3-8B79-37D633B846F1}">
-                <asvg:svgBlip xmlns:asvg="http://schemas.microsoft.com/office/drawing/2016/SVG/main" xmlns="" r:embed="rId7"/>
+                <asvg:svgBlip xmlns="" xmlns:asvg="http://schemas.microsoft.com/office/drawing/2016/SVG/main" r:embed="rId7"/>
               </a:ext>
             </a:extLst>
           </a:blip>
@@ -28933,7 +28864,7 @@
           <a:blip r:embed="rId24">
             <a:extLst>
               <a:ext uri="{96DAC541-7B7A-43D3-8B79-37D633B846F1}">
-                <asvg:svgBlip xmlns:asvg="http://schemas.microsoft.com/office/drawing/2016/SVG/main" xmlns="" r:embed="rId25"/>
+                <asvg:svgBlip xmlns="" xmlns:asvg="http://schemas.microsoft.com/office/drawing/2016/SVG/main" r:embed="rId25"/>
               </a:ext>
             </a:extLst>
           </a:blip>
@@ -28965,8 +28896,8 @@
         </p:nvSpPr>
         <p:spPr>
           <a:xfrm>
-            <a:off x="706051" y="1394136"/>
-            <a:ext cx="1437007" cy="461665"/>
+            <a:off x="535069" y="1394136"/>
+            <a:ext cx="1713010" cy="461665"/>
           </a:xfrm>
           <a:prstGeom prst="rect">
             <a:avLst/>
@@ -29007,7 +28938,21 @@
                 <a:ea typeface="+mn-ea"/>
                 <a:cs typeface="+mn-cs"/>
               </a:rPr>
-              <a:t>AWS IoT SiteWise Monitor</a:t>
+              <a:t>AWS IoT SiteWise </a:t>
+            </a:r>
+            <a:r>
+              <a:rPr kumimoji="0" lang="en-US" sz="1200" b="0" u="none" strike="noStrike" kern="1200" cap="none" spc="0" normalizeH="0" baseline="0" noProof="0" dirty="0" smtClean="0">
+                <a:ln>
+                  <a:noFill/>
+                </a:ln>
+                <a:effectLst/>
+                <a:uLnTx/>
+                <a:uFillTx/>
+                <a:latin typeface="Amazon Ember"/>
+                <a:ea typeface="+mn-ea"/>
+                <a:cs typeface="+mn-cs"/>
+              </a:rPr>
+              <a:t>Monitor (dashboard)</a:t>
             </a:r>
             <a:endParaRPr kumimoji="0" lang="en-US" sz="1400" b="0" u="none" strike="noStrike" kern="1200" cap="none" spc="0" normalizeH="0" baseline="0" noProof="0" dirty="0">
               <a:ln>
@@ -29038,7 +28983,7 @@
         <p:spPr>
           <a:xfrm>
             <a:off x="1933268" y="1395427"/>
-            <a:ext cx="1921851" cy="276999"/>
+            <a:ext cx="1921851" cy="461665"/>
           </a:xfrm>
           <a:prstGeom prst="rect">
             <a:avLst/>
@@ -29079,7 +29024,48 @@
                 <a:ea typeface="+mn-ea"/>
                 <a:cs typeface="+mn-cs"/>
               </a:rPr>
-              <a:t>Amazon QuickSight</a:t>
+              <a:t>Amazon </a:t>
+            </a:r>
+            <a:r>
+              <a:rPr kumimoji="0" lang="en-US" sz="1200" b="0" u="none" strike="noStrike" kern="1200" cap="none" spc="0" normalizeH="0" baseline="0" noProof="0" dirty="0" smtClean="0">
+                <a:ln>
+                  <a:noFill/>
+                </a:ln>
+                <a:effectLst/>
+                <a:uLnTx/>
+                <a:uFillTx/>
+                <a:latin typeface="Amazon Ember"/>
+                <a:ea typeface="+mn-ea"/>
+                <a:cs typeface="+mn-cs"/>
+              </a:rPr>
+              <a:t>QuickSight</a:t>
+            </a:r>
+            <a:br>
+              <a:rPr kumimoji="0" lang="en-US" sz="1200" b="0" u="none" strike="noStrike" kern="1200" cap="none" spc="0" normalizeH="0" baseline="0" noProof="0" dirty="0" smtClean="0">
+                <a:ln>
+                  <a:noFill/>
+                </a:ln>
+                <a:effectLst/>
+                <a:uLnTx/>
+                <a:uFillTx/>
+                <a:latin typeface="Amazon Ember"/>
+                <a:ea typeface="+mn-ea"/>
+                <a:cs typeface="+mn-cs"/>
+              </a:rPr>
+            </a:br>
+            <a:r>
+              <a:rPr kumimoji="0" lang="en-US" sz="1200" b="0" u="none" strike="noStrike" kern="1200" cap="none" spc="0" normalizeH="0" baseline="0" noProof="0" dirty="0" smtClean="0">
+                <a:ln>
+                  <a:noFill/>
+                </a:ln>
+                <a:effectLst/>
+                <a:uLnTx/>
+                <a:uFillTx/>
+                <a:latin typeface="Amazon Ember"/>
+                <a:ea typeface="+mn-ea"/>
+                <a:cs typeface="+mn-cs"/>
+              </a:rPr>
+              <a:t>(dashboard)</a:t>
             </a:r>
             <a:endParaRPr kumimoji="0" lang="en-US" sz="1400" b="0" u="none" strike="noStrike" kern="1200" cap="none" spc="0" normalizeH="0" baseline="0" noProof="0" dirty="0">
               <a:ln>
@@ -29779,7 +29765,7 @@
           <a:blip r:embed="rId2">
             <a:extLst>
               <a:ext uri="{96DAC541-7B7A-43D3-8B79-37D633B846F1}">
-                <asvg:svgBlip xmlns:asvg="http://schemas.microsoft.com/office/drawing/2016/SVG/main" xmlns="" r:embed="rId3"/>
+                <asvg:svgBlip xmlns="" xmlns:asvg="http://schemas.microsoft.com/office/drawing/2016/SVG/main" r:embed="rId3"/>
               </a:ext>
             </a:extLst>
           </a:blip>
@@ -29815,7 +29801,7 @@
           <a:blip r:embed="rId4">
             <a:extLst>
               <a:ext uri="{96DAC541-7B7A-43D3-8B79-37D633B846F1}">
-                <asvg:svgBlip xmlns:asvg="http://schemas.microsoft.com/office/drawing/2016/SVG/main" xmlns="" r:embed="rId5"/>
+                <asvg:svgBlip xmlns="" xmlns:asvg="http://schemas.microsoft.com/office/drawing/2016/SVG/main" r:embed="rId5"/>
               </a:ext>
             </a:extLst>
           </a:blip>
@@ -29887,7 +29873,7 @@
           <a:blip r:embed="rId6">
             <a:extLst>
               <a:ext uri="{96DAC541-7B7A-43D3-8B79-37D633B846F1}">
-                <asvg:svgBlip xmlns:asvg="http://schemas.microsoft.com/office/drawing/2016/SVG/main" xmlns="" r:embed="rId7"/>
+                <asvg:svgBlip xmlns="" xmlns:asvg="http://schemas.microsoft.com/office/drawing/2016/SVG/main" r:embed="rId7"/>
               </a:ext>
             </a:extLst>
           </a:blip>
@@ -29959,7 +29945,7 @@
           <a:blip r:embed="rId8">
             <a:extLst>
               <a:ext uri="{96DAC541-7B7A-43D3-8B79-37D633B846F1}">
-                <asvg:svgBlip xmlns:asvg="http://schemas.microsoft.com/office/drawing/2016/SVG/main" xmlns="" r:embed="rId9"/>
+                <asvg:svgBlip xmlns="" xmlns:asvg="http://schemas.microsoft.com/office/drawing/2016/SVG/main" r:embed="rId9"/>
               </a:ext>
             </a:extLst>
           </a:blip>
@@ -30031,7 +30017,7 @@
           <a:blip r:embed="rId10">
             <a:extLst>
               <a:ext uri="{96DAC541-7B7A-43D3-8B79-37D633B846F1}">
-                <asvg:svgBlip xmlns:asvg="http://schemas.microsoft.com/office/drawing/2016/SVG/main" xmlns="" r:embed="rId11"/>
+                <asvg:svgBlip xmlns="" xmlns:asvg="http://schemas.microsoft.com/office/drawing/2016/SVG/main" r:embed="rId11"/>
               </a:ext>
             </a:extLst>
           </a:blip>
@@ -30157,7 +30143,7 @@
           <a:blip r:embed="rId10">
             <a:extLst>
               <a:ext uri="{96DAC541-7B7A-43D3-8B79-37D633B846F1}">
-                <asvg:svgBlip xmlns:asvg="http://schemas.microsoft.com/office/drawing/2016/SVG/main" xmlns="" r:embed="rId11"/>
+                <asvg:svgBlip xmlns="" xmlns:asvg="http://schemas.microsoft.com/office/drawing/2016/SVG/main" r:embed="rId11"/>
               </a:ext>
             </a:extLst>
           </a:blip>
@@ -30229,7 +30215,7 @@
           <a:blip r:embed="rId12">
             <a:extLst>
               <a:ext uri="{96DAC541-7B7A-43D3-8B79-37D633B846F1}">
-                <asvg:svgBlip xmlns:asvg="http://schemas.microsoft.com/office/drawing/2016/SVG/main" xmlns="" r:embed="rId13"/>
+                <asvg:svgBlip xmlns="" xmlns:asvg="http://schemas.microsoft.com/office/drawing/2016/SVG/main" r:embed="rId13"/>
               </a:ext>
             </a:extLst>
           </a:blip>
@@ -30697,7 +30683,7 @@
           <a:blip r:embed="rId6">
             <a:extLst>
               <a:ext uri="{96DAC541-7B7A-43D3-8B79-37D633B846F1}">
-                <asvg:svgBlip xmlns:asvg="http://schemas.microsoft.com/office/drawing/2016/SVG/main" xmlns="" r:embed="rId7"/>
+                <asvg:svgBlip xmlns="" xmlns:asvg="http://schemas.microsoft.com/office/drawing/2016/SVG/main" r:embed="rId7"/>
               </a:ext>
             </a:extLst>
           </a:blip>
@@ -31431,7 +31417,7 @@
           <a:blip r:embed="rId14">
             <a:extLst>
               <a:ext uri="{96DAC541-7B7A-43D3-8B79-37D633B846F1}">
-                <asvg:svgBlip xmlns:asvg="http://schemas.microsoft.com/office/drawing/2016/SVG/main" xmlns="" r:embed="rId15"/>
+                <asvg:svgBlip xmlns="" xmlns:asvg="http://schemas.microsoft.com/office/drawing/2016/SVG/main" r:embed="rId15"/>
               </a:ext>
             </a:extLst>
           </a:blip>
@@ -32674,7 +32660,7 @@
           <a:blip r:embed="rId2">
             <a:extLst>
               <a:ext uri="{96DAC541-7B7A-43D3-8B79-37D633B846F1}">
-                <asvg:svgBlip xmlns:asvg="http://schemas.microsoft.com/office/drawing/2016/SVG/main" xmlns="" r:embed="rId3"/>
+                <asvg:svgBlip xmlns="" xmlns:asvg="http://schemas.microsoft.com/office/drawing/2016/SVG/main" r:embed="rId3"/>
               </a:ext>
             </a:extLst>
           </a:blip>
@@ -32710,7 +32696,7 @@
           <a:blip r:embed="rId4">
             <a:extLst>
               <a:ext uri="{96DAC541-7B7A-43D3-8B79-37D633B846F1}">
-                <asvg:svgBlip xmlns:asvg="http://schemas.microsoft.com/office/drawing/2016/SVG/main" xmlns="" r:embed="rId5"/>
+                <asvg:svgBlip xmlns="" xmlns:asvg="http://schemas.microsoft.com/office/drawing/2016/SVG/main" r:embed="rId5"/>
               </a:ext>
             </a:extLst>
           </a:blip>
@@ -32782,7 +32768,7 @@
           <a:blip r:embed="rId6">
             <a:extLst>
               <a:ext uri="{96DAC541-7B7A-43D3-8B79-37D633B846F1}">
-                <asvg:svgBlip xmlns:asvg="http://schemas.microsoft.com/office/drawing/2016/SVG/main" xmlns="" r:embed="rId7"/>
+                <asvg:svgBlip xmlns="" xmlns:asvg="http://schemas.microsoft.com/office/drawing/2016/SVG/main" r:embed="rId7"/>
               </a:ext>
             </a:extLst>
           </a:blip>
@@ -32854,7 +32840,7 @@
           <a:blip r:embed="rId8">
             <a:extLst>
               <a:ext uri="{96DAC541-7B7A-43D3-8B79-37D633B846F1}">
-                <asvg:svgBlip xmlns:asvg="http://schemas.microsoft.com/office/drawing/2016/SVG/main" xmlns="" r:embed="rId9"/>
+                <asvg:svgBlip xmlns="" xmlns:asvg="http://schemas.microsoft.com/office/drawing/2016/SVG/main" r:embed="rId9"/>
               </a:ext>
             </a:extLst>
           </a:blip>
@@ -32926,7 +32912,7 @@
           <a:blip r:embed="rId10">
             <a:extLst>
               <a:ext uri="{96DAC541-7B7A-43D3-8B79-37D633B846F1}">
-                <asvg:svgBlip xmlns:asvg="http://schemas.microsoft.com/office/drawing/2016/SVG/main" xmlns="" r:embed="rId11"/>
+                <asvg:svgBlip xmlns="" xmlns:asvg="http://schemas.microsoft.com/office/drawing/2016/SVG/main" r:embed="rId11"/>
               </a:ext>
             </a:extLst>
           </a:blip>
@@ -33052,7 +33038,7 @@
           <a:blip r:embed="rId10">
             <a:extLst>
               <a:ext uri="{96DAC541-7B7A-43D3-8B79-37D633B846F1}">
-                <asvg:svgBlip xmlns:asvg="http://schemas.microsoft.com/office/drawing/2016/SVG/main" xmlns="" r:embed="rId11"/>
+                <asvg:svgBlip xmlns="" xmlns:asvg="http://schemas.microsoft.com/office/drawing/2016/SVG/main" r:embed="rId11"/>
               </a:ext>
             </a:extLst>
           </a:blip>
@@ -33124,7 +33110,7 @@
           <a:blip r:embed="rId12">
             <a:extLst>
               <a:ext uri="{96DAC541-7B7A-43D3-8B79-37D633B846F1}">
-                <asvg:svgBlip xmlns:asvg="http://schemas.microsoft.com/office/drawing/2016/SVG/main" xmlns="" r:embed="rId13"/>
+                <asvg:svgBlip xmlns="" xmlns:asvg="http://schemas.microsoft.com/office/drawing/2016/SVG/main" r:embed="rId13"/>
               </a:ext>
             </a:extLst>
           </a:blip>
@@ -33509,7 +33495,7 @@
           <a:blip r:embed="rId6">
             <a:extLst>
               <a:ext uri="{96DAC541-7B7A-43D3-8B79-37D633B846F1}">
-                <asvg:svgBlip xmlns:asvg="http://schemas.microsoft.com/office/drawing/2016/SVG/main" xmlns="" r:embed="rId7"/>
+                <asvg:svgBlip xmlns="" xmlns:asvg="http://schemas.microsoft.com/office/drawing/2016/SVG/main" r:embed="rId7"/>
               </a:ext>
             </a:extLst>
           </a:blip>
@@ -33699,7 +33685,7 @@
           <a:blip r:embed="rId14">
             <a:extLst>
               <a:ext uri="{96DAC541-7B7A-43D3-8B79-37D633B846F1}">
-                <asvg:svgBlip xmlns:asvg="http://schemas.microsoft.com/office/drawing/2016/SVG/main" xmlns="" r:embed="rId15"/>
+                <asvg:svgBlip xmlns="" xmlns:asvg="http://schemas.microsoft.com/office/drawing/2016/SVG/main" r:embed="rId15"/>
               </a:ext>
             </a:extLst>
           </a:blip>
@@ -35948,7 +35934,7 @@
           <a:blip r:embed="rId2">
             <a:extLst>
               <a:ext uri="{96DAC541-7B7A-43D3-8B79-37D633B846F1}">
-                <asvg:svgBlip xmlns:asvg="http://schemas.microsoft.com/office/drawing/2016/SVG/main" xmlns="" r:embed="rId3"/>
+                <asvg:svgBlip xmlns="" xmlns:asvg="http://schemas.microsoft.com/office/drawing/2016/SVG/main" r:embed="rId3"/>
               </a:ext>
             </a:extLst>
           </a:blip>
@@ -35984,7 +35970,7 @@
           <a:blip r:embed="rId4">
             <a:extLst>
               <a:ext uri="{96DAC541-7B7A-43D3-8B79-37D633B846F1}">
-                <asvg:svgBlip xmlns:asvg="http://schemas.microsoft.com/office/drawing/2016/SVG/main" xmlns="" r:embed="rId5"/>
+                <asvg:svgBlip xmlns="" xmlns:asvg="http://schemas.microsoft.com/office/drawing/2016/SVG/main" r:embed="rId5"/>
               </a:ext>
             </a:extLst>
           </a:blip>
@@ -36056,7 +36042,7 @@
           <a:blip r:embed="rId6">
             <a:extLst>
               <a:ext uri="{96DAC541-7B7A-43D3-8B79-37D633B846F1}">
-                <asvg:svgBlip xmlns:asvg="http://schemas.microsoft.com/office/drawing/2016/SVG/main" xmlns="" r:embed="rId7"/>
+                <asvg:svgBlip xmlns="" xmlns:asvg="http://schemas.microsoft.com/office/drawing/2016/SVG/main" r:embed="rId7"/>
               </a:ext>
             </a:extLst>
           </a:blip>
@@ -36128,7 +36114,7 @@
           <a:blip r:embed="rId8">
             <a:extLst>
               <a:ext uri="{96DAC541-7B7A-43D3-8B79-37D633B846F1}">
-                <asvg:svgBlip xmlns:asvg="http://schemas.microsoft.com/office/drawing/2016/SVG/main" xmlns="" r:embed="rId9"/>
+                <asvg:svgBlip xmlns="" xmlns:asvg="http://schemas.microsoft.com/office/drawing/2016/SVG/main" r:embed="rId9"/>
               </a:ext>
             </a:extLst>
           </a:blip>
@@ -36200,7 +36186,7 @@
           <a:blip r:embed="rId10">
             <a:extLst>
               <a:ext uri="{96DAC541-7B7A-43D3-8B79-37D633B846F1}">
-                <asvg:svgBlip xmlns:asvg="http://schemas.microsoft.com/office/drawing/2016/SVG/main" xmlns="" r:embed="rId11"/>
+                <asvg:svgBlip xmlns="" xmlns:asvg="http://schemas.microsoft.com/office/drawing/2016/SVG/main" r:embed="rId11"/>
               </a:ext>
             </a:extLst>
           </a:blip>
@@ -36326,7 +36312,7 @@
           <a:blip r:embed="rId10">
             <a:extLst>
               <a:ext uri="{96DAC541-7B7A-43D3-8B79-37D633B846F1}">
-                <asvg:svgBlip xmlns:asvg="http://schemas.microsoft.com/office/drawing/2016/SVG/main" xmlns="" r:embed="rId11"/>
+                <asvg:svgBlip xmlns="" xmlns:asvg="http://schemas.microsoft.com/office/drawing/2016/SVG/main" r:embed="rId11"/>
               </a:ext>
             </a:extLst>
           </a:blip>
@@ -36398,7 +36384,7 @@
           <a:blip r:embed="rId12">
             <a:extLst>
               <a:ext uri="{96DAC541-7B7A-43D3-8B79-37D633B846F1}">
-                <asvg:svgBlip xmlns:asvg="http://schemas.microsoft.com/office/drawing/2016/SVG/main" xmlns="" r:embed="rId13"/>
+                <asvg:svgBlip xmlns="" xmlns:asvg="http://schemas.microsoft.com/office/drawing/2016/SVG/main" r:embed="rId13"/>
               </a:ext>
             </a:extLst>
           </a:blip>
@@ -36783,7 +36769,7 @@
           <a:blip r:embed="rId6">
             <a:extLst>
               <a:ext uri="{96DAC541-7B7A-43D3-8B79-37D633B846F1}">
-                <asvg:svgBlip xmlns:asvg="http://schemas.microsoft.com/office/drawing/2016/SVG/main" xmlns="" r:embed="rId7"/>
+                <asvg:svgBlip xmlns="" xmlns:asvg="http://schemas.microsoft.com/office/drawing/2016/SVG/main" r:embed="rId7"/>
               </a:ext>
             </a:extLst>
           </a:blip>
@@ -36973,7 +36959,7 @@
           <a:blip r:embed="rId14">
             <a:extLst>
               <a:ext uri="{96DAC541-7B7A-43D3-8B79-37D633B846F1}">
-                <asvg:svgBlip xmlns:asvg="http://schemas.microsoft.com/office/drawing/2016/SVG/main" xmlns="" r:embed="rId15"/>
+                <asvg:svgBlip xmlns="" xmlns:asvg="http://schemas.microsoft.com/office/drawing/2016/SVG/main" r:embed="rId15"/>
               </a:ext>
             </a:extLst>
           </a:blip>

</xml_diff>